<commit_message>
More slides regarding significant numbers
</commit_message>
<xml_diff>
--- a/presentation-content/migrating-from-prometheus-to-vm.pptx
+++ b/presentation-content/migrating-from-prometheus-to-vm.pptx
@@ -5,7 +5,7 @@
     <p:sldMasterId id="2147483816" r:id="rId1"/>
   </p:sldMasterIdLst>
   <p:notesMasterIdLst>
-    <p:notesMasterId r:id="rId49"/>
+    <p:notesMasterId r:id="rId54"/>
   </p:notesMasterIdLst>
   <p:sldIdLst>
     <p:sldId id="256" r:id="rId2"/>
@@ -55,6 +55,11 @@
     <p:sldId id="304" r:id="rId46"/>
     <p:sldId id="305" r:id="rId47"/>
     <p:sldId id="306" r:id="rId48"/>
+    <p:sldId id="307" r:id="rId49"/>
+    <p:sldId id="308" r:id="rId50"/>
+    <p:sldId id="309" r:id="rId51"/>
+    <p:sldId id="310" r:id="rId52"/>
+    <p:sldId id="311" r:id="rId53"/>
   </p:sldIdLst>
   <p:sldSz cx="12192000" cy="6858000"/>
   <p:notesSz cx="6858000" cy="9144000"/>
@@ -12090,6 +12095,219 @@
 </p:sld>
 </file>
 
+<file path=ppt/slides/slide48.xml><?xml version="1.0" encoding="utf-8"?>
+<p:sld xmlns:a="http://schemas.openxmlformats.org/drawingml/2006/main" xmlns:r="http://schemas.openxmlformats.org/officeDocument/2006/relationships" xmlns:p="http://schemas.openxmlformats.org/presentationml/2006/main">
+  <p:cSld>
+    <p:spTree>
+      <p:nvGrpSpPr>
+        <p:cNvPr id="1" name=""/>
+        <p:cNvGrpSpPr/>
+        <p:nvPr/>
+      </p:nvGrpSpPr>
+      <p:grpSpPr>
+        <a:xfrm>
+          <a:off x="0" y="0"/>
+          <a:ext cx="0" cy="0"/>
+          <a:chOff x="0" y="0"/>
+          <a:chExt cx="0" cy="0"/>
+        </a:xfrm>
+      </p:grpSpPr>
+      <p:sp>
+        <p:nvSpPr>
+          <p:cNvPr id="2" name="Title 1">
+            <a:extLst>
+              <a:ext uri="{FF2B5EF4-FFF2-40B4-BE49-F238E27FC236}">
+                <a16:creationId xmlns:a16="http://schemas.microsoft.com/office/drawing/2014/main" id="{0E82121E-9811-9B81-7869-68CC0735CF5B}"/>
+              </a:ext>
+            </a:extLst>
+          </p:cNvPr>
+          <p:cNvSpPr>
+            <a:spLocks noGrp="1"/>
+          </p:cNvSpPr>
+          <p:nvPr>
+            <p:ph type="title"/>
+          </p:nvPr>
+        </p:nvSpPr>
+        <p:spPr>
+          <a:xfrm>
+            <a:off x="838200" y="2766218"/>
+            <a:ext cx="10515600" cy="1325563"/>
+          </a:xfrm>
+        </p:spPr>
+        <p:txBody>
+          <a:bodyPr/>
+          <a:lstStyle/>
+          <a:p>
+            <a:r>
+              <a:rPr lang="en-BG" dirty="0"/>
+              <a:t>Data compaction and storage</a:t>
+            </a:r>
+          </a:p>
+        </p:txBody>
+      </p:sp>
+    </p:spTree>
+    <p:extLst>
+      <p:ext uri="{BB962C8B-B14F-4D97-AF65-F5344CB8AC3E}">
+        <p14:creationId xmlns:p14="http://schemas.microsoft.com/office/powerpoint/2010/main" val="1996430444"/>
+      </p:ext>
+    </p:extLst>
+  </p:cSld>
+  <p:clrMapOvr>
+    <a:masterClrMapping/>
+  </p:clrMapOvr>
+</p:sld>
+</file>
+
+<file path=ppt/slides/slide49.xml><?xml version="1.0" encoding="utf-8"?>
+<p:sld xmlns:a="http://schemas.openxmlformats.org/drawingml/2006/main" xmlns:r="http://schemas.openxmlformats.org/officeDocument/2006/relationships" xmlns:p="http://schemas.openxmlformats.org/presentationml/2006/main">
+  <p:cSld>
+    <p:spTree>
+      <p:nvGrpSpPr>
+        <p:cNvPr id="1" name=""/>
+        <p:cNvGrpSpPr/>
+        <p:nvPr/>
+      </p:nvGrpSpPr>
+      <p:grpSpPr>
+        <a:xfrm>
+          <a:off x="0" y="0"/>
+          <a:ext cx="0" cy="0"/>
+          <a:chOff x="0" y="0"/>
+          <a:chExt cx="0" cy="0"/>
+        </a:xfrm>
+      </p:grpSpPr>
+      <p:sp>
+        <p:nvSpPr>
+          <p:cNvPr id="2" name="Title 1">
+            <a:extLst>
+              <a:ext uri="{FF2B5EF4-FFF2-40B4-BE49-F238E27FC236}">
+                <a16:creationId xmlns:a16="http://schemas.microsoft.com/office/drawing/2014/main" id="{EC28E84F-F7DC-9FBA-2CAE-CBA2B9F93FA2}"/>
+              </a:ext>
+            </a:extLst>
+          </p:cNvPr>
+          <p:cNvSpPr>
+            <a:spLocks noGrp="1"/>
+          </p:cNvSpPr>
+          <p:nvPr>
+            <p:ph type="title"/>
+          </p:nvPr>
+        </p:nvSpPr>
+        <p:spPr/>
+        <p:txBody>
+          <a:bodyPr/>
+          <a:lstStyle/>
+          <a:p>
+            <a:r>
+              <a:rPr lang="en-BG" dirty="0"/>
+              <a:t>Bytes per data point</a:t>
+            </a:r>
+          </a:p>
+        </p:txBody>
+      </p:sp>
+      <p:sp>
+        <p:nvSpPr>
+          <p:cNvPr id="3" name="Content Placeholder 2">
+            <a:extLst>
+              <a:ext uri="{FF2B5EF4-FFF2-40B4-BE49-F238E27FC236}">
+                <a16:creationId xmlns:a16="http://schemas.microsoft.com/office/drawing/2014/main" id="{EECC9B28-0A21-3408-CA2D-C544AA6B0F7F}"/>
+              </a:ext>
+            </a:extLst>
+          </p:cNvPr>
+          <p:cNvSpPr>
+            <a:spLocks noGrp="1"/>
+          </p:cNvSpPr>
+          <p:nvPr>
+            <p:ph idx="1"/>
+          </p:nvPr>
+        </p:nvSpPr>
+        <p:spPr/>
+        <p:txBody>
+          <a:bodyPr/>
+          <a:lstStyle/>
+          <a:p>
+            <a:pPr marL="0" indent="0">
+              <a:buNone/>
+            </a:pPr>
+            <a:r>
+              <a:rPr lang="en-BG" dirty="0"/>
+              <a:t>VictoriaMetrics self monitoring dashboards</a:t>
+            </a:r>
+          </a:p>
+          <a:p>
+            <a:pPr marL="0" indent="0">
+              <a:buNone/>
+            </a:pPr>
+            <a:r>
+              <a:rPr lang="en-GB" dirty="0"/>
+              <a:t>https://</a:t>
+            </a:r>
+            <a:r>
+              <a:rPr lang="en-GB" dirty="0" err="1"/>
+              <a:t>grafana.com</a:t>
+            </a:r>
+            <a:r>
+              <a:rPr lang="en-GB" dirty="0"/>
+              <a:t>/orgs/</a:t>
+            </a:r>
+            <a:r>
+              <a:rPr lang="en-GB" dirty="0" err="1"/>
+              <a:t>victoriametrics</a:t>
+            </a:r>
+            <a:r>
+              <a:rPr lang="en-GB" dirty="0"/>
+              <a:t>/dashboards</a:t>
+            </a:r>
+          </a:p>
+          <a:p>
+            <a:pPr marL="0" indent="0">
+              <a:buNone/>
+            </a:pPr>
+            <a:endParaRPr lang="en-BG" dirty="0"/>
+          </a:p>
+        </p:txBody>
+      </p:sp>
+      <p:pic>
+        <p:nvPicPr>
+          <p:cNvPr id="8" name="Picture 7" descr="A black background with white text and green numbers&#10;&#10;AI-generated content may be incorrect.">
+            <a:extLst>
+              <a:ext uri="{FF2B5EF4-FFF2-40B4-BE49-F238E27FC236}">
+                <a16:creationId xmlns:a16="http://schemas.microsoft.com/office/drawing/2014/main" id="{6F2112BA-3ED7-8291-BB09-C123FC3E14F4}"/>
+              </a:ext>
+            </a:extLst>
+          </p:cNvPr>
+          <p:cNvPicPr>
+            <a:picLocks noChangeAspect="1"/>
+          </p:cNvPicPr>
+          <p:nvPr/>
+        </p:nvPicPr>
+        <p:blipFill>
+          <a:blip r:embed="rId2"/>
+          <a:stretch>
+            <a:fillRect/>
+          </a:stretch>
+        </p:blipFill>
+        <p:spPr>
+          <a:xfrm>
+            <a:off x="3981450" y="3544094"/>
+            <a:ext cx="4229100" cy="914400"/>
+          </a:xfrm>
+          <a:prstGeom prst="rect">
+            <a:avLst/>
+          </a:prstGeom>
+        </p:spPr>
+      </p:pic>
+    </p:spTree>
+    <p:extLst>
+      <p:ext uri="{BB962C8B-B14F-4D97-AF65-F5344CB8AC3E}">
+        <p14:creationId xmlns:p14="http://schemas.microsoft.com/office/powerpoint/2010/main" val="992486189"/>
+      </p:ext>
+    </p:extLst>
+  </p:cSld>
+  <p:clrMapOvr>
+    <a:masterClrMapping/>
+  </p:clrMapOvr>
+</p:sld>
+</file>
+
 <file path=ppt/slides/slide5.xml><?xml version="1.0" encoding="utf-8"?>
 <p:sld xmlns:a="http://schemas.openxmlformats.org/drawingml/2006/main" xmlns:r="http://schemas.openxmlformats.org/officeDocument/2006/relationships" xmlns:p="http://schemas.openxmlformats.org/presentationml/2006/main">
   <p:cSld>
@@ -12173,6 +12391,312 @@
     <p:extLst>
       <p:ext uri="{BB962C8B-B14F-4D97-AF65-F5344CB8AC3E}">
         <p14:creationId xmlns:p14="http://schemas.microsoft.com/office/powerpoint/2010/main" val="2715313740"/>
+      </p:ext>
+    </p:extLst>
+  </p:cSld>
+  <p:clrMapOvr>
+    <a:masterClrMapping/>
+  </p:clrMapOvr>
+</p:sld>
+</file>
+
+<file path=ppt/slides/slide50.xml><?xml version="1.0" encoding="utf-8"?>
+<p:sld xmlns:a="http://schemas.openxmlformats.org/drawingml/2006/main" xmlns:r="http://schemas.openxmlformats.org/officeDocument/2006/relationships" xmlns:p="http://schemas.openxmlformats.org/presentationml/2006/main">
+  <p:cSld>
+    <p:spTree>
+      <p:nvGrpSpPr>
+        <p:cNvPr id="1" name="">
+          <a:extLst>
+            <a:ext uri="{FF2B5EF4-FFF2-40B4-BE49-F238E27FC236}">
+              <a16:creationId xmlns:a16="http://schemas.microsoft.com/office/drawing/2014/main" id="{8F81D8FB-A2E3-0421-8920-F751FA402112}"/>
+            </a:ext>
+          </a:extLst>
+        </p:cNvPr>
+        <p:cNvGrpSpPr/>
+        <p:nvPr/>
+      </p:nvGrpSpPr>
+      <p:grpSpPr>
+        <a:xfrm>
+          <a:off x="0" y="0"/>
+          <a:ext cx="0" cy="0"/>
+          <a:chOff x="0" y="0"/>
+          <a:chExt cx="0" cy="0"/>
+        </a:xfrm>
+      </p:grpSpPr>
+      <p:sp>
+        <p:nvSpPr>
+          <p:cNvPr id="2" name="Title 1">
+            <a:extLst>
+              <a:ext uri="{FF2B5EF4-FFF2-40B4-BE49-F238E27FC236}">
+                <a16:creationId xmlns:a16="http://schemas.microsoft.com/office/drawing/2014/main" id="{41E9F2AF-0DAF-181B-B2D9-F25A4440ADC7}"/>
+              </a:ext>
+            </a:extLst>
+          </p:cNvPr>
+          <p:cNvSpPr>
+            <a:spLocks noGrp="1"/>
+          </p:cNvSpPr>
+          <p:nvPr>
+            <p:ph type="title"/>
+          </p:nvPr>
+        </p:nvSpPr>
+        <p:spPr/>
+        <p:txBody>
+          <a:bodyPr/>
+          <a:lstStyle/>
+          <a:p>
+            <a:r>
+              <a:rPr lang="en-BG" dirty="0"/>
+              <a:t>Bytes per data point</a:t>
+            </a:r>
+          </a:p>
+        </p:txBody>
+      </p:sp>
+      <p:pic>
+        <p:nvPicPr>
+          <p:cNvPr id="5" name="Content Placeholder 4" descr="A black background with white text and green text&#10;&#10;AI-generated content may be incorrect.">
+            <a:extLst>
+              <a:ext uri="{FF2B5EF4-FFF2-40B4-BE49-F238E27FC236}">
+                <a16:creationId xmlns:a16="http://schemas.microsoft.com/office/drawing/2014/main" id="{03620D56-7381-66DF-68A2-1031453AC159}"/>
+              </a:ext>
+            </a:extLst>
+          </p:cNvPr>
+          <p:cNvPicPr>
+            <a:picLocks noGrp="1" noChangeAspect="1"/>
+          </p:cNvPicPr>
+          <p:nvPr>
+            <p:ph idx="1"/>
+          </p:nvPr>
+        </p:nvPicPr>
+        <p:blipFill>
+          <a:blip r:embed="rId2"/>
+          <a:stretch>
+            <a:fillRect/>
+          </a:stretch>
+        </p:blipFill>
+        <p:spPr>
+          <a:xfrm>
+            <a:off x="3981450" y="3544094"/>
+            <a:ext cx="4229100" cy="914400"/>
+          </a:xfrm>
+        </p:spPr>
+      </p:pic>
+    </p:spTree>
+    <p:extLst>
+      <p:ext uri="{BB962C8B-B14F-4D97-AF65-F5344CB8AC3E}">
+        <p14:creationId xmlns:p14="http://schemas.microsoft.com/office/powerpoint/2010/main" val="275113179"/>
+      </p:ext>
+    </p:extLst>
+  </p:cSld>
+  <p:clrMapOvr>
+    <a:masterClrMapping/>
+  </p:clrMapOvr>
+</p:sld>
+</file>
+
+<file path=ppt/slides/slide51.xml><?xml version="1.0" encoding="utf-8"?>
+<p:sld xmlns:a="http://schemas.openxmlformats.org/drawingml/2006/main" xmlns:r="http://schemas.openxmlformats.org/officeDocument/2006/relationships" xmlns:p="http://schemas.openxmlformats.org/presentationml/2006/main">
+  <p:cSld>
+    <p:spTree>
+      <p:nvGrpSpPr>
+        <p:cNvPr id="1" name=""/>
+        <p:cNvGrpSpPr/>
+        <p:nvPr/>
+      </p:nvGrpSpPr>
+      <p:grpSpPr>
+        <a:xfrm>
+          <a:off x="0" y="0"/>
+          <a:ext cx="0" cy="0"/>
+          <a:chOff x="0" y="0"/>
+          <a:chExt cx="0" cy="0"/>
+        </a:xfrm>
+      </p:grpSpPr>
+      <p:sp>
+        <p:nvSpPr>
+          <p:cNvPr id="2" name="Title 1">
+            <a:extLst>
+              <a:ext uri="{FF2B5EF4-FFF2-40B4-BE49-F238E27FC236}">
+                <a16:creationId xmlns:a16="http://schemas.microsoft.com/office/drawing/2014/main" id="{30EDBD81-D82C-F77C-A761-5E14DCC982CE}"/>
+              </a:ext>
+            </a:extLst>
+          </p:cNvPr>
+          <p:cNvSpPr>
+            <a:spLocks noGrp="1"/>
+          </p:cNvSpPr>
+          <p:nvPr>
+            <p:ph type="title"/>
+          </p:nvPr>
+        </p:nvSpPr>
+        <p:spPr>
+          <a:xfrm>
+            <a:off x="838200" y="2766218"/>
+            <a:ext cx="10515600" cy="1325563"/>
+          </a:xfrm>
+        </p:spPr>
+        <p:txBody>
+          <a:bodyPr/>
+          <a:lstStyle/>
+          <a:p>
+            <a:r>
+              <a:rPr lang="en-BG" dirty="0"/>
+              <a:t>Too much digits after decimal point …</a:t>
+            </a:r>
+          </a:p>
+        </p:txBody>
+      </p:sp>
+    </p:spTree>
+    <p:extLst>
+      <p:ext uri="{BB962C8B-B14F-4D97-AF65-F5344CB8AC3E}">
+        <p14:creationId xmlns:p14="http://schemas.microsoft.com/office/powerpoint/2010/main" val="3157855345"/>
+      </p:ext>
+    </p:extLst>
+  </p:cSld>
+  <p:clrMapOvr>
+    <a:masterClrMapping/>
+  </p:clrMapOvr>
+</p:sld>
+</file>
+
+<file path=ppt/slides/slide52.xml><?xml version="1.0" encoding="utf-8"?>
+<p:sld xmlns:a="http://schemas.openxmlformats.org/drawingml/2006/main" xmlns:r="http://schemas.openxmlformats.org/officeDocument/2006/relationships" xmlns:p="http://schemas.openxmlformats.org/presentationml/2006/main">
+  <p:cSld>
+    <p:spTree>
+      <p:nvGrpSpPr>
+        <p:cNvPr id="1" name=""/>
+        <p:cNvGrpSpPr/>
+        <p:nvPr/>
+      </p:nvGrpSpPr>
+      <p:grpSpPr>
+        <a:xfrm>
+          <a:off x="0" y="0"/>
+          <a:ext cx="0" cy="0"/>
+          <a:chOff x="0" y="0"/>
+          <a:chExt cx="0" cy="0"/>
+        </a:xfrm>
+      </p:grpSpPr>
+      <p:sp>
+        <p:nvSpPr>
+          <p:cNvPr id="2" name="Title 1">
+            <a:extLst>
+              <a:ext uri="{FF2B5EF4-FFF2-40B4-BE49-F238E27FC236}">
+                <a16:creationId xmlns:a16="http://schemas.microsoft.com/office/drawing/2014/main" id="{4E6D07D0-1C1B-5AE2-A76A-DE3B4E084B6A}"/>
+              </a:ext>
+            </a:extLst>
+          </p:cNvPr>
+          <p:cNvSpPr>
+            <a:spLocks noGrp="1"/>
+          </p:cNvSpPr>
+          <p:nvPr>
+            <p:ph type="title"/>
+          </p:nvPr>
+        </p:nvSpPr>
+        <p:spPr/>
+        <p:txBody>
+          <a:bodyPr/>
+          <a:lstStyle/>
+          <a:p>
+            <a:r>
+              <a:rPr lang="en-BG" dirty="0"/>
+              <a:t>Too much digits after decimal point …</a:t>
+            </a:r>
+          </a:p>
+        </p:txBody>
+      </p:sp>
+      <p:sp>
+        <p:nvSpPr>
+          <p:cNvPr id="3" name="Content Placeholder 2">
+            <a:extLst>
+              <a:ext uri="{FF2B5EF4-FFF2-40B4-BE49-F238E27FC236}">
+                <a16:creationId xmlns:a16="http://schemas.microsoft.com/office/drawing/2014/main" id="{92A4FC00-0A0F-E95E-27FB-6B2D4EFBB4AF}"/>
+              </a:ext>
+            </a:extLst>
+          </p:cNvPr>
+          <p:cNvSpPr>
+            <a:spLocks noGrp="1"/>
+          </p:cNvSpPr>
+          <p:nvPr>
+            <p:ph idx="1"/>
+          </p:nvPr>
+        </p:nvSpPr>
+        <p:spPr/>
+        <p:txBody>
+          <a:bodyPr/>
+          <a:lstStyle/>
+          <a:p>
+            <a:pPr marL="0" indent="0">
+              <a:buNone/>
+            </a:pPr>
+            <a:r>
+              <a:rPr lang="en-GB" dirty="0"/>
+              <a:t>If we have data points like:</a:t>
+            </a:r>
+          </a:p>
+          <a:p>
+            <a:pPr marL="0" indent="0">
+              <a:buNone/>
+            </a:pPr>
+            <a:endParaRPr lang="en-GB" dirty="0"/>
+          </a:p>
+          <a:p>
+            <a:pPr marL="0" indent="0">
+              <a:buNone/>
+            </a:pPr>
+            <a:r>
+              <a:rPr lang="en-GB" dirty="0"/>
+              <a:t>rate5m:cpu_usage{instance="172.17.206.32:9100", core="2", mode="idle"} 32.</a:t>
+            </a:r>
+            <a:r>
+              <a:rPr lang="en-GB" b="1" dirty="0"/>
+              <a:t>923713468383242</a:t>
+            </a:r>
+            <a:r>
+              <a:rPr lang="en-GB" dirty="0"/>
+              <a:t> (with 14 digits after digital point)</a:t>
+            </a:r>
+          </a:p>
+          <a:p>
+            <a:pPr marL="0" indent="0">
+              <a:buNone/>
+            </a:pPr>
+            <a:endParaRPr lang="en-BG" dirty="0"/>
+          </a:p>
+          <a:p>
+            <a:pPr marL="0" indent="0">
+              <a:buNone/>
+            </a:pPr>
+            <a:r>
+              <a:rPr lang="en-BG" dirty="0"/>
+              <a:t>When we migrating old data we can use </a:t>
+            </a:r>
+            <a:r>
+              <a:rPr lang="en-GB" b="1" dirty="0"/>
+              <a:t>--</a:t>
+            </a:r>
+            <a:r>
+              <a:rPr lang="en-GB" b="1" dirty="0" err="1"/>
+              <a:t>vm</a:t>
+            </a:r>
+            <a:r>
+              <a:rPr lang="en-GB" b="1" dirty="0"/>
+              <a:t>-round-digits</a:t>
+            </a:r>
+            <a:r>
+              <a:rPr lang="en-GB" dirty="0"/>
+              <a:t> to round up float64 values after decimal point.</a:t>
+            </a:r>
+            <a:endParaRPr lang="en-GB" b="1" dirty="0"/>
+          </a:p>
+          <a:p>
+            <a:pPr marL="0" indent="0">
+              <a:buNone/>
+            </a:pPr>
+            <a:endParaRPr lang="en-BG" dirty="0"/>
+          </a:p>
+        </p:txBody>
+      </p:sp>
+    </p:spTree>
+    <p:extLst>
+      <p:ext uri="{BB962C8B-B14F-4D97-AF65-F5344CB8AC3E}">
+        <p14:creationId xmlns:p14="http://schemas.microsoft.com/office/powerpoint/2010/main" val="546886061"/>
       </p:ext>
     </p:extLst>
   </p:cSld>

</xml_diff>

<commit_message>
Add efects to presentation
</commit_message>
<xml_diff>
--- a/presentation-content/migrating-from-prometheus-to-vm.pptx
+++ b/presentation-content/migrating-from-prometheus-to-vm.pptx
@@ -4478,7 +4478,7 @@
             </a:pPr>
             <a:r>
               <a:rPr lang="en-GB" sz="2400" dirty="0"/>
-              <a:t> Histogram and summaries - More complex TS structures where we can store and extract information for a </a:t>
+              <a:t>Histogram and summaries - More complex TS structures where we can store and extract information for a </a:t>
             </a:r>
             <a:r>
               <a:rPr lang="en-GB" sz="2400" b="1" dirty="0"/>
@@ -4515,6 +4515,186 @@
   <p:clrMapOvr>
     <a:masterClrMapping/>
   </p:clrMapOvr>
+  <p:timing>
+    <p:tnLst>
+      <p:par>
+        <p:cTn id="1" dur="indefinite" restart="never" nodeType="tmRoot">
+          <p:childTnLst>
+            <p:seq concurrent="1" nextAc="seek">
+              <p:cTn id="2" dur="indefinite" nodeType="mainSeq">
+                <p:childTnLst>
+                  <p:par>
+                    <p:cTn id="3" fill="hold">
+                      <p:stCondLst>
+                        <p:cond delay="indefinite"/>
+                      </p:stCondLst>
+                      <p:childTnLst>
+                        <p:par>
+                          <p:cTn id="4" fill="hold">
+                            <p:stCondLst>
+                              <p:cond delay="0"/>
+                            </p:stCondLst>
+                            <p:childTnLst>
+                              <p:par>
+                                <p:cTn id="5" presetID="1" presetClass="entr" presetSubtype="0" fill="hold" grpId="0" nodeType="clickEffect">
+                                  <p:stCondLst>
+                                    <p:cond delay="0"/>
+                                  </p:stCondLst>
+                                  <p:childTnLst>
+                                    <p:set>
+                                      <p:cBhvr>
+                                        <p:cTn id="6" dur="1" fill="hold">
+                                          <p:stCondLst>
+                                            <p:cond delay="0"/>
+                                          </p:stCondLst>
+                                        </p:cTn>
+                                        <p:tgtEl>
+                                          <p:spTgt spid="4">
+                                            <p:txEl>
+                                              <p:pRg st="0" end="0"/>
+                                            </p:txEl>
+                                          </p:spTgt>
+                                        </p:tgtEl>
+                                        <p:attrNameLst>
+                                          <p:attrName>style.visibility</p:attrName>
+                                        </p:attrNameLst>
+                                      </p:cBhvr>
+                                      <p:to>
+                                        <p:strVal val="visible"/>
+                                      </p:to>
+                                    </p:set>
+                                  </p:childTnLst>
+                                </p:cTn>
+                              </p:par>
+                            </p:childTnLst>
+                          </p:cTn>
+                        </p:par>
+                      </p:childTnLst>
+                    </p:cTn>
+                  </p:par>
+                  <p:par>
+                    <p:cTn id="7" fill="hold">
+                      <p:stCondLst>
+                        <p:cond delay="indefinite"/>
+                      </p:stCondLst>
+                      <p:childTnLst>
+                        <p:par>
+                          <p:cTn id="8" fill="hold">
+                            <p:stCondLst>
+                              <p:cond delay="0"/>
+                            </p:stCondLst>
+                            <p:childTnLst>
+                              <p:par>
+                                <p:cTn id="9" presetID="1" presetClass="entr" presetSubtype="0" fill="hold" grpId="0" nodeType="clickEffect">
+                                  <p:stCondLst>
+                                    <p:cond delay="0"/>
+                                  </p:stCondLst>
+                                  <p:childTnLst>
+                                    <p:set>
+                                      <p:cBhvr>
+                                        <p:cTn id="10" dur="1" fill="hold">
+                                          <p:stCondLst>
+                                            <p:cond delay="0"/>
+                                          </p:stCondLst>
+                                        </p:cTn>
+                                        <p:tgtEl>
+                                          <p:spTgt spid="4">
+                                            <p:txEl>
+                                              <p:pRg st="1" end="1"/>
+                                            </p:txEl>
+                                          </p:spTgt>
+                                        </p:tgtEl>
+                                        <p:attrNameLst>
+                                          <p:attrName>style.visibility</p:attrName>
+                                        </p:attrNameLst>
+                                      </p:cBhvr>
+                                      <p:to>
+                                        <p:strVal val="visible"/>
+                                      </p:to>
+                                    </p:set>
+                                  </p:childTnLst>
+                                </p:cTn>
+                              </p:par>
+                            </p:childTnLst>
+                          </p:cTn>
+                        </p:par>
+                      </p:childTnLst>
+                    </p:cTn>
+                  </p:par>
+                  <p:par>
+                    <p:cTn id="11" fill="hold">
+                      <p:stCondLst>
+                        <p:cond delay="indefinite"/>
+                      </p:stCondLst>
+                      <p:childTnLst>
+                        <p:par>
+                          <p:cTn id="12" fill="hold">
+                            <p:stCondLst>
+                              <p:cond delay="0"/>
+                            </p:stCondLst>
+                            <p:childTnLst>
+                              <p:par>
+                                <p:cTn id="13" presetID="1" presetClass="entr" presetSubtype="0" fill="hold" grpId="0" nodeType="clickEffect">
+                                  <p:stCondLst>
+                                    <p:cond delay="0"/>
+                                  </p:stCondLst>
+                                  <p:childTnLst>
+                                    <p:set>
+                                      <p:cBhvr>
+                                        <p:cTn id="14" dur="1" fill="hold">
+                                          <p:stCondLst>
+                                            <p:cond delay="0"/>
+                                          </p:stCondLst>
+                                        </p:cTn>
+                                        <p:tgtEl>
+                                          <p:spTgt spid="4">
+                                            <p:txEl>
+                                              <p:pRg st="2" end="2"/>
+                                            </p:txEl>
+                                          </p:spTgt>
+                                        </p:tgtEl>
+                                        <p:attrNameLst>
+                                          <p:attrName>style.visibility</p:attrName>
+                                        </p:attrNameLst>
+                                      </p:cBhvr>
+                                      <p:to>
+                                        <p:strVal val="visible"/>
+                                      </p:to>
+                                    </p:set>
+                                  </p:childTnLst>
+                                </p:cTn>
+                              </p:par>
+                            </p:childTnLst>
+                          </p:cTn>
+                        </p:par>
+                      </p:childTnLst>
+                    </p:cTn>
+                  </p:par>
+                </p:childTnLst>
+              </p:cTn>
+              <p:prevCondLst>
+                <p:cond evt="onPrev" delay="0">
+                  <p:tgtEl>
+                    <p:sldTgt/>
+                  </p:tgtEl>
+                </p:cond>
+              </p:prevCondLst>
+              <p:nextCondLst>
+                <p:cond evt="onNext" delay="0">
+                  <p:tgtEl>
+                    <p:sldTgt/>
+                  </p:tgtEl>
+                </p:cond>
+              </p:nextCondLst>
+            </p:seq>
+          </p:childTnLst>
+        </p:cTn>
+      </p:par>
+    </p:tnLst>
+    <p:bldLst>
+      <p:bldP spid="4" grpId="0" build="p"/>
+    </p:bldLst>
+  </p:timing>
 </p:sld>
 </file>
 
@@ -6545,6 +6725,137 @@
   <p:clrMapOvr>
     <a:masterClrMapping/>
   </p:clrMapOvr>
+  <p:timing>
+    <p:tnLst>
+      <p:par>
+        <p:cTn id="1" dur="indefinite" restart="never" nodeType="tmRoot">
+          <p:childTnLst>
+            <p:seq concurrent="1" nextAc="seek">
+              <p:cTn id="2" dur="indefinite" nodeType="mainSeq">
+                <p:childTnLst>
+                  <p:par>
+                    <p:cTn id="3" fill="hold">
+                      <p:stCondLst>
+                        <p:cond delay="indefinite"/>
+                      </p:stCondLst>
+                      <p:childTnLst>
+                        <p:par>
+                          <p:cTn id="4" fill="hold">
+                            <p:stCondLst>
+                              <p:cond delay="0"/>
+                            </p:stCondLst>
+                            <p:childTnLst>
+                              <p:par>
+                                <p:cTn id="5" presetID="1" presetClass="entr" presetSubtype="0" fill="hold" grpId="0" nodeType="clickEffect">
+                                  <p:stCondLst>
+                                    <p:cond delay="0"/>
+                                  </p:stCondLst>
+                                  <p:childTnLst>
+                                    <p:set>
+                                      <p:cBhvr>
+                                        <p:cTn id="6" dur="1" fill="hold">
+                                          <p:stCondLst>
+                                            <p:cond delay="0"/>
+                                          </p:stCondLst>
+                                        </p:cTn>
+                                        <p:tgtEl>
+                                          <p:spTgt spid="3">
+                                            <p:txEl>
+                                              <p:pRg st="0" end="0"/>
+                                            </p:txEl>
+                                          </p:spTgt>
+                                        </p:tgtEl>
+                                        <p:attrNameLst>
+                                          <p:attrName>style.visibility</p:attrName>
+                                        </p:attrNameLst>
+                                      </p:cBhvr>
+                                      <p:to>
+                                        <p:strVal val="visible"/>
+                                      </p:to>
+                                    </p:set>
+                                  </p:childTnLst>
+                                </p:cTn>
+                              </p:par>
+                            </p:childTnLst>
+                          </p:cTn>
+                        </p:par>
+                      </p:childTnLst>
+                    </p:cTn>
+                  </p:par>
+                  <p:par>
+                    <p:cTn id="7" fill="hold">
+                      <p:stCondLst>
+                        <p:cond delay="indefinite"/>
+                      </p:stCondLst>
+                      <p:childTnLst>
+                        <p:par>
+                          <p:cTn id="8" fill="hold">
+                            <p:stCondLst>
+                              <p:cond delay="0"/>
+                            </p:stCondLst>
+                            <p:childTnLst>
+                              <p:par>
+                                <p:cTn id="9" presetID="1" presetClass="entr" presetSubtype="0" fill="hold" grpId="0" nodeType="clickEffect">
+                                  <p:stCondLst>
+                                    <p:cond delay="0"/>
+                                  </p:stCondLst>
+                                  <p:childTnLst>
+                                    <p:set>
+                                      <p:cBhvr>
+                                        <p:cTn id="10" dur="1" fill="hold">
+                                          <p:stCondLst>
+                                            <p:cond delay="0"/>
+                                          </p:stCondLst>
+                                        </p:cTn>
+                                        <p:tgtEl>
+                                          <p:spTgt spid="3">
+                                            <p:txEl>
+                                              <p:pRg st="1" end="1"/>
+                                            </p:txEl>
+                                          </p:spTgt>
+                                        </p:tgtEl>
+                                        <p:attrNameLst>
+                                          <p:attrName>style.visibility</p:attrName>
+                                        </p:attrNameLst>
+                                      </p:cBhvr>
+                                      <p:to>
+                                        <p:strVal val="visible"/>
+                                      </p:to>
+                                    </p:set>
+                                  </p:childTnLst>
+                                </p:cTn>
+                              </p:par>
+                            </p:childTnLst>
+                          </p:cTn>
+                        </p:par>
+                      </p:childTnLst>
+                    </p:cTn>
+                  </p:par>
+                </p:childTnLst>
+              </p:cTn>
+              <p:prevCondLst>
+                <p:cond evt="onPrev" delay="0">
+                  <p:tgtEl>
+                    <p:sldTgt/>
+                  </p:tgtEl>
+                </p:cond>
+              </p:prevCondLst>
+              <p:nextCondLst>
+                <p:cond evt="onNext" delay="0">
+                  <p:tgtEl>
+                    <p:sldTgt/>
+                  </p:tgtEl>
+                </p:cond>
+              </p:nextCondLst>
+            </p:seq>
+          </p:childTnLst>
+        </p:cTn>
+      </p:par>
+    </p:tnLst>
+    <p:bldLst>
+      <p:bldP spid="3" grpId="0" build="p"/>
+    </p:bldLst>
+  </p:timing>
 </p:sld>
 </file>
 
@@ -7746,13 +8057,8 @@
             </a:r>
             <a:r>
               <a:rPr lang="en-GB" b="1" dirty="0"/>
-              <a:t>multitenancy</a:t>
-            </a:r>
-          </a:p>
-          <a:p>
-            <a:pPr marL="0" indent="0">
-              <a:buNone/>
-            </a:pPr>
+              <a:t>multitenancy </a:t>
+            </a:r>
             <a:r>
               <a:rPr lang="en-GB" dirty="0"/>
               <a:t>of the components.</a:t>
@@ -7776,6 +8082,284 @@
   <p:clrMapOvr>
     <a:masterClrMapping/>
   </p:clrMapOvr>
+  <p:timing>
+    <p:tnLst>
+      <p:par>
+        <p:cTn id="1" dur="indefinite" restart="never" nodeType="tmRoot">
+          <p:childTnLst>
+            <p:seq concurrent="1" nextAc="seek">
+              <p:cTn id="2" dur="indefinite" nodeType="mainSeq">
+                <p:childTnLst>
+                  <p:par>
+                    <p:cTn id="3" fill="hold">
+                      <p:stCondLst>
+                        <p:cond delay="indefinite"/>
+                      </p:stCondLst>
+                      <p:childTnLst>
+                        <p:par>
+                          <p:cTn id="4" fill="hold">
+                            <p:stCondLst>
+                              <p:cond delay="0"/>
+                            </p:stCondLst>
+                            <p:childTnLst>
+                              <p:par>
+                                <p:cTn id="5" presetID="1" presetClass="entr" presetSubtype="0" fill="hold" grpId="0" nodeType="clickEffect">
+                                  <p:stCondLst>
+                                    <p:cond delay="0"/>
+                                  </p:stCondLst>
+                                  <p:childTnLst>
+                                    <p:set>
+                                      <p:cBhvr>
+                                        <p:cTn id="6" dur="1" fill="hold">
+                                          <p:stCondLst>
+                                            <p:cond delay="0"/>
+                                          </p:stCondLst>
+                                        </p:cTn>
+                                        <p:tgtEl>
+                                          <p:spTgt spid="8">
+                                            <p:txEl>
+                                              <p:pRg st="0" end="0"/>
+                                            </p:txEl>
+                                          </p:spTgt>
+                                        </p:tgtEl>
+                                        <p:attrNameLst>
+                                          <p:attrName>style.visibility</p:attrName>
+                                        </p:attrNameLst>
+                                      </p:cBhvr>
+                                      <p:to>
+                                        <p:strVal val="visible"/>
+                                      </p:to>
+                                    </p:set>
+                                  </p:childTnLst>
+                                </p:cTn>
+                              </p:par>
+                            </p:childTnLst>
+                          </p:cTn>
+                        </p:par>
+                      </p:childTnLst>
+                    </p:cTn>
+                  </p:par>
+                  <p:par>
+                    <p:cTn id="7" fill="hold">
+                      <p:stCondLst>
+                        <p:cond delay="indefinite"/>
+                      </p:stCondLst>
+                      <p:childTnLst>
+                        <p:par>
+                          <p:cTn id="8" fill="hold">
+                            <p:stCondLst>
+                              <p:cond delay="0"/>
+                            </p:stCondLst>
+                            <p:childTnLst>
+                              <p:par>
+                                <p:cTn id="9" presetID="1" presetClass="entr" presetSubtype="0" fill="hold" grpId="0" nodeType="clickEffect">
+                                  <p:stCondLst>
+                                    <p:cond delay="0"/>
+                                  </p:stCondLst>
+                                  <p:childTnLst>
+                                    <p:set>
+                                      <p:cBhvr>
+                                        <p:cTn id="10" dur="1" fill="hold">
+                                          <p:stCondLst>
+                                            <p:cond delay="0"/>
+                                          </p:stCondLst>
+                                        </p:cTn>
+                                        <p:tgtEl>
+                                          <p:spTgt spid="8">
+                                            <p:txEl>
+                                              <p:pRg st="1" end="1"/>
+                                            </p:txEl>
+                                          </p:spTgt>
+                                        </p:tgtEl>
+                                        <p:attrNameLst>
+                                          <p:attrName>style.visibility</p:attrName>
+                                        </p:attrNameLst>
+                                      </p:cBhvr>
+                                      <p:to>
+                                        <p:strVal val="visible"/>
+                                      </p:to>
+                                    </p:set>
+                                  </p:childTnLst>
+                                </p:cTn>
+                              </p:par>
+                            </p:childTnLst>
+                          </p:cTn>
+                        </p:par>
+                      </p:childTnLst>
+                    </p:cTn>
+                  </p:par>
+                  <p:par>
+                    <p:cTn id="11" fill="hold">
+                      <p:stCondLst>
+                        <p:cond delay="indefinite"/>
+                      </p:stCondLst>
+                      <p:childTnLst>
+                        <p:par>
+                          <p:cTn id="12" fill="hold">
+                            <p:stCondLst>
+                              <p:cond delay="0"/>
+                            </p:stCondLst>
+                            <p:childTnLst>
+                              <p:par>
+                                <p:cTn id="13" presetID="1" presetClass="entr" presetSubtype="0" fill="hold" grpId="0" nodeType="clickEffect">
+                                  <p:stCondLst>
+                                    <p:cond delay="0"/>
+                                  </p:stCondLst>
+                                  <p:childTnLst>
+                                    <p:set>
+                                      <p:cBhvr>
+                                        <p:cTn id="14" dur="1" fill="hold">
+                                          <p:stCondLst>
+                                            <p:cond delay="0"/>
+                                          </p:stCondLst>
+                                        </p:cTn>
+                                        <p:tgtEl>
+                                          <p:spTgt spid="8">
+                                            <p:txEl>
+                                              <p:pRg st="2" end="2"/>
+                                            </p:txEl>
+                                          </p:spTgt>
+                                        </p:tgtEl>
+                                        <p:attrNameLst>
+                                          <p:attrName>style.visibility</p:attrName>
+                                        </p:attrNameLst>
+                                      </p:cBhvr>
+                                      <p:to>
+                                        <p:strVal val="visible"/>
+                                      </p:to>
+                                    </p:set>
+                                  </p:childTnLst>
+                                </p:cTn>
+                              </p:par>
+                            </p:childTnLst>
+                          </p:cTn>
+                        </p:par>
+                      </p:childTnLst>
+                    </p:cTn>
+                  </p:par>
+                  <p:par>
+                    <p:cTn id="15" fill="hold">
+                      <p:stCondLst>
+                        <p:cond delay="indefinite"/>
+                      </p:stCondLst>
+                      <p:childTnLst>
+                        <p:par>
+                          <p:cTn id="16" fill="hold">
+                            <p:stCondLst>
+                              <p:cond delay="0"/>
+                            </p:stCondLst>
+                            <p:childTnLst>
+                              <p:par>
+                                <p:cTn id="17" presetID="1" presetClass="entr" presetSubtype="0" fill="hold" grpId="0" nodeType="clickEffect">
+                                  <p:stCondLst>
+                                    <p:cond delay="0"/>
+                                  </p:stCondLst>
+                                  <p:childTnLst>
+                                    <p:set>
+                                      <p:cBhvr>
+                                        <p:cTn id="18" dur="1" fill="hold">
+                                          <p:stCondLst>
+                                            <p:cond delay="0"/>
+                                          </p:stCondLst>
+                                        </p:cTn>
+                                        <p:tgtEl>
+                                          <p:spTgt spid="8">
+                                            <p:txEl>
+                                              <p:pRg st="3" end="3"/>
+                                            </p:txEl>
+                                          </p:spTgt>
+                                        </p:tgtEl>
+                                        <p:attrNameLst>
+                                          <p:attrName>style.visibility</p:attrName>
+                                        </p:attrNameLst>
+                                      </p:cBhvr>
+                                      <p:to>
+                                        <p:strVal val="visible"/>
+                                      </p:to>
+                                    </p:set>
+                                  </p:childTnLst>
+                                </p:cTn>
+                              </p:par>
+                            </p:childTnLst>
+                          </p:cTn>
+                        </p:par>
+                      </p:childTnLst>
+                    </p:cTn>
+                  </p:par>
+                  <p:par>
+                    <p:cTn id="19" fill="hold">
+                      <p:stCondLst>
+                        <p:cond delay="indefinite"/>
+                      </p:stCondLst>
+                      <p:childTnLst>
+                        <p:par>
+                          <p:cTn id="20" fill="hold">
+                            <p:stCondLst>
+                              <p:cond delay="0"/>
+                            </p:stCondLst>
+                            <p:childTnLst>
+                              <p:par>
+                                <p:cTn id="21" presetID="1" presetClass="entr" presetSubtype="0" fill="hold" grpId="0" nodeType="clickEffect">
+                                  <p:stCondLst>
+                                    <p:cond delay="0"/>
+                                  </p:stCondLst>
+                                  <p:childTnLst>
+                                    <p:set>
+                                      <p:cBhvr>
+                                        <p:cTn id="22" dur="1" fill="hold">
+                                          <p:stCondLst>
+                                            <p:cond delay="0"/>
+                                          </p:stCondLst>
+                                        </p:cTn>
+                                        <p:tgtEl>
+                                          <p:spTgt spid="8">
+                                            <p:txEl>
+                                              <p:pRg st="5" end="5"/>
+                                            </p:txEl>
+                                          </p:spTgt>
+                                        </p:tgtEl>
+                                        <p:attrNameLst>
+                                          <p:attrName>style.visibility</p:attrName>
+                                        </p:attrNameLst>
+                                      </p:cBhvr>
+                                      <p:to>
+                                        <p:strVal val="visible"/>
+                                      </p:to>
+                                    </p:set>
+                                  </p:childTnLst>
+                                </p:cTn>
+                              </p:par>
+                            </p:childTnLst>
+                          </p:cTn>
+                        </p:par>
+                      </p:childTnLst>
+                    </p:cTn>
+                  </p:par>
+                </p:childTnLst>
+              </p:cTn>
+              <p:prevCondLst>
+                <p:cond evt="onPrev" delay="0">
+                  <p:tgtEl>
+                    <p:sldTgt/>
+                  </p:tgtEl>
+                </p:cond>
+              </p:prevCondLst>
+              <p:nextCondLst>
+                <p:cond evt="onNext" delay="0">
+                  <p:tgtEl>
+                    <p:sldTgt/>
+                  </p:tgtEl>
+                </p:cond>
+              </p:nextCondLst>
+            </p:seq>
+          </p:childTnLst>
+        </p:cTn>
+      </p:par>
+    </p:tnLst>
+    <p:bldLst>
+      <p:bldP spid="8" grpId="0" uiExpand="1" build="p"/>
+    </p:bldLst>
+  </p:timing>
 </p:sld>
 </file>
 
@@ -8207,15 +8791,7 @@
             </a:pPr>
             <a:r>
               <a:rPr lang="en-BG" dirty="0"/>
-              <a:t>VictoriaMetrics support total</a:t>
-            </a:r>
-            <a:r>
-              <a:rPr lang="en-GB" dirty="0"/>
-              <a:t>l</a:t>
-            </a:r>
-            <a:r>
-              <a:rPr lang="en-BG" dirty="0"/>
-              <a:t>y Prometheus </a:t>
+              <a:t>VictoriaMetrics support Prometheus </a:t>
             </a:r>
             <a:r>
               <a:rPr lang="en-BG" b="1" dirty="0"/>
@@ -8223,7 +8799,7 @@
             </a:r>
             <a:r>
               <a:rPr lang="en-BG" dirty="0"/>
-              <a:t> and without any configuration from VM end we can have all </a:t>
+              <a:t> and without any configuration from VM end we can have all the </a:t>
             </a:r>
             <a:r>
               <a:rPr lang="en-BG" b="1" dirty="0"/>
@@ -8588,6 +9164,134 @@
   <p:clrMapOvr>
     <a:masterClrMapping/>
   </p:clrMapOvr>
+  <p:timing>
+    <p:tnLst>
+      <p:par>
+        <p:cTn id="1" dur="indefinite" restart="never" nodeType="tmRoot">
+          <p:childTnLst>
+            <p:seq concurrent="1" nextAc="seek">
+              <p:cTn id="2" dur="indefinite" nodeType="mainSeq">
+                <p:childTnLst>
+                  <p:par>
+                    <p:cTn id="3" fill="hold">
+                      <p:stCondLst>
+                        <p:cond delay="indefinite"/>
+                      </p:stCondLst>
+                      <p:childTnLst>
+                        <p:par>
+                          <p:cTn id="4" fill="hold">
+                            <p:stCondLst>
+                              <p:cond delay="0"/>
+                            </p:stCondLst>
+                            <p:childTnLst>
+                              <p:par>
+                                <p:cTn id="5" presetID="1" presetClass="entr" presetSubtype="0" fill="hold" grpId="0" nodeType="clickEffect">
+                                  <p:stCondLst>
+                                    <p:cond delay="0"/>
+                                  </p:stCondLst>
+                                  <p:childTnLst>
+                                    <p:set>
+                                      <p:cBhvr>
+                                        <p:cTn id="6" dur="1" fill="hold">
+                                          <p:stCondLst>
+                                            <p:cond delay="0"/>
+                                          </p:stCondLst>
+                                        </p:cTn>
+                                        <p:tgtEl>
+                                          <p:spTgt spid="7">
+                                            <p:txEl>
+                                              <p:pRg st="0" end="0"/>
+                                            </p:txEl>
+                                          </p:spTgt>
+                                        </p:tgtEl>
+                                        <p:attrNameLst>
+                                          <p:attrName>style.visibility</p:attrName>
+                                        </p:attrNameLst>
+                                      </p:cBhvr>
+                                      <p:to>
+                                        <p:strVal val="visible"/>
+                                      </p:to>
+                                    </p:set>
+                                  </p:childTnLst>
+                                </p:cTn>
+                              </p:par>
+                            </p:childTnLst>
+                          </p:cTn>
+                        </p:par>
+                      </p:childTnLst>
+                    </p:cTn>
+                  </p:par>
+                  <p:par>
+                    <p:cTn id="7" fill="hold">
+                      <p:stCondLst>
+                        <p:cond delay="indefinite"/>
+                      </p:stCondLst>
+                      <p:childTnLst>
+                        <p:par>
+                          <p:cTn id="8" fill="hold">
+                            <p:stCondLst>
+                              <p:cond delay="0"/>
+                            </p:stCondLst>
+                            <p:childTnLst>
+                              <p:par>
+                                <p:cTn id="9" presetID="1" presetClass="entr" presetSubtype="0" fill="hold" grpId="0" nodeType="clickEffect">
+                                  <p:stCondLst>
+                                    <p:cond delay="0"/>
+                                  </p:stCondLst>
+                                  <p:childTnLst>
+                                    <p:set>
+                                      <p:cBhvr>
+                                        <p:cTn id="10" dur="1" fill="hold">
+                                          <p:stCondLst>
+                                            <p:cond delay="0"/>
+                                          </p:stCondLst>
+                                        </p:cTn>
+                                        <p:tgtEl>
+                                          <p:spTgt spid="8"/>
+                                        </p:tgtEl>
+                                        <p:attrNameLst>
+                                          <p:attrName>style.visibility</p:attrName>
+                                        </p:attrNameLst>
+                                      </p:cBhvr>
+                                      <p:to>
+                                        <p:strVal val="visible"/>
+                                      </p:to>
+                                    </p:set>
+                                  </p:childTnLst>
+                                </p:cTn>
+                              </p:par>
+                            </p:childTnLst>
+                          </p:cTn>
+                        </p:par>
+                      </p:childTnLst>
+                    </p:cTn>
+                  </p:par>
+                </p:childTnLst>
+              </p:cTn>
+              <p:prevCondLst>
+                <p:cond evt="onPrev" delay="0">
+                  <p:tgtEl>
+                    <p:sldTgt/>
+                  </p:tgtEl>
+                </p:cond>
+              </p:prevCondLst>
+              <p:nextCondLst>
+                <p:cond evt="onNext" delay="0">
+                  <p:tgtEl>
+                    <p:sldTgt/>
+                  </p:tgtEl>
+                </p:cond>
+              </p:nextCondLst>
+            </p:seq>
+          </p:childTnLst>
+        </p:cTn>
+      </p:par>
+    </p:tnLst>
+    <p:bldLst>
+      <p:bldP spid="7" grpId="0" build="p"/>
+      <p:bldP spid="8" grpId="0"/>
+    </p:bldLst>
+  </p:timing>
 </p:sld>
 </file>
 
@@ -10348,6 +11052,186 @@
   <p:clrMapOvr>
     <a:masterClrMapping/>
   </p:clrMapOvr>
+  <p:timing>
+    <p:tnLst>
+      <p:par>
+        <p:cTn id="1" dur="indefinite" restart="never" nodeType="tmRoot">
+          <p:childTnLst>
+            <p:seq concurrent="1" nextAc="seek">
+              <p:cTn id="2" dur="indefinite" nodeType="mainSeq">
+                <p:childTnLst>
+                  <p:par>
+                    <p:cTn id="3" fill="hold">
+                      <p:stCondLst>
+                        <p:cond delay="indefinite"/>
+                      </p:stCondLst>
+                      <p:childTnLst>
+                        <p:par>
+                          <p:cTn id="4" fill="hold">
+                            <p:stCondLst>
+                              <p:cond delay="0"/>
+                            </p:stCondLst>
+                            <p:childTnLst>
+                              <p:par>
+                                <p:cTn id="5" presetID="1" presetClass="entr" presetSubtype="0" fill="hold" grpId="0" nodeType="clickEffect">
+                                  <p:stCondLst>
+                                    <p:cond delay="0"/>
+                                  </p:stCondLst>
+                                  <p:childTnLst>
+                                    <p:set>
+                                      <p:cBhvr>
+                                        <p:cTn id="6" dur="1" fill="hold">
+                                          <p:stCondLst>
+                                            <p:cond delay="0"/>
+                                          </p:stCondLst>
+                                        </p:cTn>
+                                        <p:tgtEl>
+                                          <p:spTgt spid="3">
+                                            <p:txEl>
+                                              <p:pRg st="0" end="0"/>
+                                            </p:txEl>
+                                          </p:spTgt>
+                                        </p:tgtEl>
+                                        <p:attrNameLst>
+                                          <p:attrName>style.visibility</p:attrName>
+                                        </p:attrNameLst>
+                                      </p:cBhvr>
+                                      <p:to>
+                                        <p:strVal val="visible"/>
+                                      </p:to>
+                                    </p:set>
+                                  </p:childTnLst>
+                                </p:cTn>
+                              </p:par>
+                            </p:childTnLst>
+                          </p:cTn>
+                        </p:par>
+                      </p:childTnLst>
+                    </p:cTn>
+                  </p:par>
+                  <p:par>
+                    <p:cTn id="7" fill="hold">
+                      <p:stCondLst>
+                        <p:cond delay="indefinite"/>
+                      </p:stCondLst>
+                      <p:childTnLst>
+                        <p:par>
+                          <p:cTn id="8" fill="hold">
+                            <p:stCondLst>
+                              <p:cond delay="0"/>
+                            </p:stCondLst>
+                            <p:childTnLst>
+                              <p:par>
+                                <p:cTn id="9" presetID="1" presetClass="entr" presetSubtype="0" fill="hold" grpId="0" nodeType="clickEffect">
+                                  <p:stCondLst>
+                                    <p:cond delay="0"/>
+                                  </p:stCondLst>
+                                  <p:childTnLst>
+                                    <p:set>
+                                      <p:cBhvr>
+                                        <p:cTn id="10" dur="1" fill="hold">
+                                          <p:stCondLst>
+                                            <p:cond delay="0"/>
+                                          </p:stCondLst>
+                                        </p:cTn>
+                                        <p:tgtEl>
+                                          <p:spTgt spid="3">
+                                            <p:txEl>
+                                              <p:pRg st="2" end="2"/>
+                                            </p:txEl>
+                                          </p:spTgt>
+                                        </p:tgtEl>
+                                        <p:attrNameLst>
+                                          <p:attrName>style.visibility</p:attrName>
+                                        </p:attrNameLst>
+                                      </p:cBhvr>
+                                      <p:to>
+                                        <p:strVal val="visible"/>
+                                      </p:to>
+                                    </p:set>
+                                  </p:childTnLst>
+                                </p:cTn>
+                              </p:par>
+                            </p:childTnLst>
+                          </p:cTn>
+                        </p:par>
+                      </p:childTnLst>
+                    </p:cTn>
+                  </p:par>
+                  <p:par>
+                    <p:cTn id="11" fill="hold">
+                      <p:stCondLst>
+                        <p:cond delay="indefinite"/>
+                      </p:stCondLst>
+                      <p:childTnLst>
+                        <p:par>
+                          <p:cTn id="12" fill="hold">
+                            <p:stCondLst>
+                              <p:cond delay="0"/>
+                            </p:stCondLst>
+                            <p:childTnLst>
+                              <p:par>
+                                <p:cTn id="13" presetID="1" presetClass="entr" presetSubtype="0" fill="hold" grpId="0" nodeType="clickEffect">
+                                  <p:stCondLst>
+                                    <p:cond delay="0"/>
+                                  </p:stCondLst>
+                                  <p:childTnLst>
+                                    <p:set>
+                                      <p:cBhvr>
+                                        <p:cTn id="14" dur="1" fill="hold">
+                                          <p:stCondLst>
+                                            <p:cond delay="0"/>
+                                          </p:stCondLst>
+                                        </p:cTn>
+                                        <p:tgtEl>
+                                          <p:spTgt spid="3">
+                                            <p:txEl>
+                                              <p:pRg st="4" end="4"/>
+                                            </p:txEl>
+                                          </p:spTgt>
+                                        </p:tgtEl>
+                                        <p:attrNameLst>
+                                          <p:attrName>style.visibility</p:attrName>
+                                        </p:attrNameLst>
+                                      </p:cBhvr>
+                                      <p:to>
+                                        <p:strVal val="visible"/>
+                                      </p:to>
+                                    </p:set>
+                                  </p:childTnLst>
+                                </p:cTn>
+                              </p:par>
+                            </p:childTnLst>
+                          </p:cTn>
+                        </p:par>
+                      </p:childTnLst>
+                    </p:cTn>
+                  </p:par>
+                </p:childTnLst>
+              </p:cTn>
+              <p:prevCondLst>
+                <p:cond evt="onPrev" delay="0">
+                  <p:tgtEl>
+                    <p:sldTgt/>
+                  </p:tgtEl>
+                </p:cond>
+              </p:prevCondLst>
+              <p:nextCondLst>
+                <p:cond evt="onNext" delay="0">
+                  <p:tgtEl>
+                    <p:sldTgt/>
+                  </p:tgtEl>
+                </p:cond>
+              </p:nextCondLst>
+            </p:seq>
+          </p:childTnLst>
+        </p:cTn>
+      </p:par>
+    </p:tnLst>
+    <p:bldLst>
+      <p:bldP spid="3" grpId="0" build="p"/>
+    </p:bldLst>
+  </p:timing>
 </p:sld>
 </file>
 
@@ -11393,7 +12277,7 @@
             </a:pPr>
             <a:r>
               <a:rPr lang="en-GB" sz="2800" dirty="0"/>
-              <a:t>$ curl -XPOST :9090/</a:t>
+              <a:t>$ curl -XPOST prometheus:9090/</a:t>
             </a:r>
             <a:r>
               <a:rPr lang="en-GB" sz="2800" dirty="0" err="1"/>
@@ -11433,6 +12317,232 @@
   <p:clrMapOvr>
     <a:masterClrMapping/>
   </p:clrMapOvr>
+  <p:timing>
+    <p:tnLst>
+      <p:par>
+        <p:cTn id="1" dur="indefinite" restart="never" nodeType="tmRoot">
+          <p:childTnLst>
+            <p:seq concurrent="1" nextAc="seek">
+              <p:cTn id="2" dur="indefinite" nodeType="mainSeq">
+                <p:childTnLst>
+                  <p:par>
+                    <p:cTn id="3" fill="hold">
+                      <p:stCondLst>
+                        <p:cond delay="indefinite"/>
+                      </p:stCondLst>
+                      <p:childTnLst>
+                        <p:par>
+                          <p:cTn id="4" fill="hold">
+                            <p:stCondLst>
+                              <p:cond delay="0"/>
+                            </p:stCondLst>
+                            <p:childTnLst>
+                              <p:par>
+                                <p:cTn id="5" presetID="1" presetClass="entr" presetSubtype="0" fill="hold" grpId="0" nodeType="clickEffect">
+                                  <p:stCondLst>
+                                    <p:cond delay="0"/>
+                                  </p:stCondLst>
+                                  <p:childTnLst>
+                                    <p:set>
+                                      <p:cBhvr>
+                                        <p:cTn id="6" dur="1" fill="hold">
+                                          <p:stCondLst>
+                                            <p:cond delay="0"/>
+                                          </p:stCondLst>
+                                        </p:cTn>
+                                        <p:tgtEl>
+                                          <p:spTgt spid="3">
+                                            <p:txEl>
+                                              <p:pRg st="0" end="0"/>
+                                            </p:txEl>
+                                          </p:spTgt>
+                                        </p:tgtEl>
+                                        <p:attrNameLst>
+                                          <p:attrName>style.visibility</p:attrName>
+                                        </p:attrNameLst>
+                                      </p:cBhvr>
+                                      <p:to>
+                                        <p:strVal val="visible"/>
+                                      </p:to>
+                                    </p:set>
+                                  </p:childTnLst>
+                                </p:cTn>
+                              </p:par>
+                            </p:childTnLst>
+                          </p:cTn>
+                        </p:par>
+                      </p:childTnLst>
+                    </p:cTn>
+                  </p:par>
+                  <p:par>
+                    <p:cTn id="7" fill="hold">
+                      <p:stCondLst>
+                        <p:cond delay="indefinite"/>
+                      </p:stCondLst>
+                      <p:childTnLst>
+                        <p:par>
+                          <p:cTn id="8" fill="hold">
+                            <p:stCondLst>
+                              <p:cond delay="0"/>
+                            </p:stCondLst>
+                            <p:childTnLst>
+                              <p:par>
+                                <p:cTn id="9" presetID="1" presetClass="entr" presetSubtype="0" fill="hold" grpId="0" nodeType="clickEffect">
+                                  <p:stCondLst>
+                                    <p:cond delay="0"/>
+                                  </p:stCondLst>
+                                  <p:childTnLst>
+                                    <p:set>
+                                      <p:cBhvr>
+                                        <p:cTn id="10" dur="1" fill="hold">
+                                          <p:stCondLst>
+                                            <p:cond delay="0"/>
+                                          </p:stCondLst>
+                                        </p:cTn>
+                                        <p:tgtEl>
+                                          <p:spTgt spid="3">
+                                            <p:txEl>
+                                              <p:pRg st="1" end="1"/>
+                                            </p:txEl>
+                                          </p:spTgt>
+                                        </p:tgtEl>
+                                        <p:attrNameLst>
+                                          <p:attrName>style.visibility</p:attrName>
+                                        </p:attrNameLst>
+                                      </p:cBhvr>
+                                      <p:to>
+                                        <p:strVal val="visible"/>
+                                      </p:to>
+                                    </p:set>
+                                  </p:childTnLst>
+                                </p:cTn>
+                              </p:par>
+                            </p:childTnLst>
+                          </p:cTn>
+                        </p:par>
+                      </p:childTnLst>
+                    </p:cTn>
+                  </p:par>
+                  <p:par>
+                    <p:cTn id="11" fill="hold">
+                      <p:stCondLst>
+                        <p:cond delay="indefinite"/>
+                      </p:stCondLst>
+                      <p:childTnLst>
+                        <p:par>
+                          <p:cTn id="12" fill="hold">
+                            <p:stCondLst>
+                              <p:cond delay="0"/>
+                            </p:stCondLst>
+                            <p:childTnLst>
+                              <p:par>
+                                <p:cTn id="13" presetID="1" presetClass="entr" presetSubtype="0" fill="hold" grpId="0" nodeType="clickEffect">
+                                  <p:stCondLst>
+                                    <p:cond delay="0"/>
+                                  </p:stCondLst>
+                                  <p:childTnLst>
+                                    <p:set>
+                                      <p:cBhvr>
+                                        <p:cTn id="14" dur="1" fill="hold">
+                                          <p:stCondLst>
+                                            <p:cond delay="0"/>
+                                          </p:stCondLst>
+                                        </p:cTn>
+                                        <p:tgtEl>
+                                          <p:spTgt spid="3">
+                                            <p:txEl>
+                                              <p:pRg st="3" end="3"/>
+                                            </p:txEl>
+                                          </p:spTgt>
+                                        </p:tgtEl>
+                                        <p:attrNameLst>
+                                          <p:attrName>style.visibility</p:attrName>
+                                        </p:attrNameLst>
+                                      </p:cBhvr>
+                                      <p:to>
+                                        <p:strVal val="visible"/>
+                                      </p:to>
+                                    </p:set>
+                                  </p:childTnLst>
+                                </p:cTn>
+                              </p:par>
+                            </p:childTnLst>
+                          </p:cTn>
+                        </p:par>
+                      </p:childTnLst>
+                    </p:cTn>
+                  </p:par>
+                  <p:par>
+                    <p:cTn id="15" fill="hold">
+                      <p:stCondLst>
+                        <p:cond delay="indefinite"/>
+                      </p:stCondLst>
+                      <p:childTnLst>
+                        <p:par>
+                          <p:cTn id="16" fill="hold">
+                            <p:stCondLst>
+                              <p:cond delay="0"/>
+                            </p:stCondLst>
+                            <p:childTnLst>
+                              <p:par>
+                                <p:cTn id="17" presetID="1" presetClass="entr" presetSubtype="0" fill="hold" grpId="0" nodeType="clickEffect">
+                                  <p:stCondLst>
+                                    <p:cond delay="0"/>
+                                  </p:stCondLst>
+                                  <p:childTnLst>
+                                    <p:set>
+                                      <p:cBhvr>
+                                        <p:cTn id="18" dur="1" fill="hold">
+                                          <p:stCondLst>
+                                            <p:cond delay="0"/>
+                                          </p:stCondLst>
+                                        </p:cTn>
+                                        <p:tgtEl>
+                                          <p:spTgt spid="6"/>
+                                        </p:tgtEl>
+                                        <p:attrNameLst>
+                                          <p:attrName>style.visibility</p:attrName>
+                                        </p:attrNameLst>
+                                      </p:cBhvr>
+                                      <p:to>
+                                        <p:strVal val="visible"/>
+                                      </p:to>
+                                    </p:set>
+                                  </p:childTnLst>
+                                </p:cTn>
+                              </p:par>
+                            </p:childTnLst>
+                          </p:cTn>
+                        </p:par>
+                      </p:childTnLst>
+                    </p:cTn>
+                  </p:par>
+                </p:childTnLst>
+              </p:cTn>
+              <p:prevCondLst>
+                <p:cond evt="onPrev" delay="0">
+                  <p:tgtEl>
+                    <p:sldTgt/>
+                  </p:tgtEl>
+                </p:cond>
+              </p:prevCondLst>
+              <p:nextCondLst>
+                <p:cond evt="onNext" delay="0">
+                  <p:tgtEl>
+                    <p:sldTgt/>
+                  </p:tgtEl>
+                </p:cond>
+              </p:nextCondLst>
+            </p:seq>
+          </p:childTnLst>
+        </p:cTn>
+      </p:par>
+    </p:tnLst>
+    <p:bldLst>
+      <p:bldP spid="3" grpId="0" uiExpand="1" build="p"/>
+      <p:bldP spid="6" grpId="0"/>
+    </p:bldLst>
+  </p:timing>
 </p:sld>
 </file>
 
@@ -11700,6 +12810,186 @@
   <p:clrMapOvr>
     <a:masterClrMapping/>
   </p:clrMapOvr>
+  <p:timing>
+    <p:tnLst>
+      <p:par>
+        <p:cTn id="1" dur="indefinite" restart="never" nodeType="tmRoot">
+          <p:childTnLst>
+            <p:seq concurrent="1" nextAc="seek">
+              <p:cTn id="2" dur="indefinite" nodeType="mainSeq">
+                <p:childTnLst>
+                  <p:par>
+                    <p:cTn id="3" fill="hold">
+                      <p:stCondLst>
+                        <p:cond delay="indefinite"/>
+                      </p:stCondLst>
+                      <p:childTnLst>
+                        <p:par>
+                          <p:cTn id="4" fill="hold">
+                            <p:stCondLst>
+                              <p:cond delay="0"/>
+                            </p:stCondLst>
+                            <p:childTnLst>
+                              <p:par>
+                                <p:cTn id="5" presetID="1" presetClass="entr" presetSubtype="0" fill="hold" grpId="0" nodeType="clickEffect">
+                                  <p:stCondLst>
+                                    <p:cond delay="0"/>
+                                  </p:stCondLst>
+                                  <p:childTnLst>
+                                    <p:set>
+                                      <p:cBhvr>
+                                        <p:cTn id="6" dur="1" fill="hold">
+                                          <p:stCondLst>
+                                            <p:cond delay="0"/>
+                                          </p:stCondLst>
+                                        </p:cTn>
+                                        <p:tgtEl>
+                                          <p:spTgt spid="11">
+                                            <p:txEl>
+                                              <p:pRg st="0" end="0"/>
+                                            </p:txEl>
+                                          </p:spTgt>
+                                        </p:tgtEl>
+                                        <p:attrNameLst>
+                                          <p:attrName>style.visibility</p:attrName>
+                                        </p:attrNameLst>
+                                      </p:cBhvr>
+                                      <p:to>
+                                        <p:strVal val="visible"/>
+                                      </p:to>
+                                    </p:set>
+                                  </p:childTnLst>
+                                </p:cTn>
+                              </p:par>
+                            </p:childTnLst>
+                          </p:cTn>
+                        </p:par>
+                      </p:childTnLst>
+                    </p:cTn>
+                  </p:par>
+                  <p:par>
+                    <p:cTn id="7" fill="hold">
+                      <p:stCondLst>
+                        <p:cond delay="indefinite"/>
+                      </p:stCondLst>
+                      <p:childTnLst>
+                        <p:par>
+                          <p:cTn id="8" fill="hold">
+                            <p:stCondLst>
+                              <p:cond delay="0"/>
+                            </p:stCondLst>
+                            <p:childTnLst>
+                              <p:par>
+                                <p:cTn id="9" presetID="1" presetClass="entr" presetSubtype="0" fill="hold" grpId="0" nodeType="clickEffect">
+                                  <p:stCondLst>
+                                    <p:cond delay="0"/>
+                                  </p:stCondLst>
+                                  <p:childTnLst>
+                                    <p:set>
+                                      <p:cBhvr>
+                                        <p:cTn id="10" dur="1" fill="hold">
+                                          <p:stCondLst>
+                                            <p:cond delay="0"/>
+                                          </p:stCondLst>
+                                        </p:cTn>
+                                        <p:tgtEl>
+                                          <p:spTgt spid="11">
+                                            <p:txEl>
+                                              <p:pRg st="1" end="1"/>
+                                            </p:txEl>
+                                          </p:spTgt>
+                                        </p:tgtEl>
+                                        <p:attrNameLst>
+                                          <p:attrName>style.visibility</p:attrName>
+                                        </p:attrNameLst>
+                                      </p:cBhvr>
+                                      <p:to>
+                                        <p:strVal val="visible"/>
+                                      </p:to>
+                                    </p:set>
+                                  </p:childTnLst>
+                                </p:cTn>
+                              </p:par>
+                            </p:childTnLst>
+                          </p:cTn>
+                        </p:par>
+                      </p:childTnLst>
+                    </p:cTn>
+                  </p:par>
+                  <p:par>
+                    <p:cTn id="11" fill="hold">
+                      <p:stCondLst>
+                        <p:cond delay="indefinite"/>
+                      </p:stCondLst>
+                      <p:childTnLst>
+                        <p:par>
+                          <p:cTn id="12" fill="hold">
+                            <p:stCondLst>
+                              <p:cond delay="0"/>
+                            </p:stCondLst>
+                            <p:childTnLst>
+                              <p:par>
+                                <p:cTn id="13" presetID="1" presetClass="entr" presetSubtype="0" fill="hold" grpId="0" nodeType="clickEffect">
+                                  <p:stCondLst>
+                                    <p:cond delay="0"/>
+                                  </p:stCondLst>
+                                  <p:childTnLst>
+                                    <p:set>
+                                      <p:cBhvr>
+                                        <p:cTn id="14" dur="1" fill="hold">
+                                          <p:stCondLst>
+                                            <p:cond delay="0"/>
+                                          </p:stCondLst>
+                                        </p:cTn>
+                                        <p:tgtEl>
+                                          <p:spTgt spid="11">
+                                            <p:txEl>
+                                              <p:pRg st="2" end="2"/>
+                                            </p:txEl>
+                                          </p:spTgt>
+                                        </p:tgtEl>
+                                        <p:attrNameLst>
+                                          <p:attrName>style.visibility</p:attrName>
+                                        </p:attrNameLst>
+                                      </p:cBhvr>
+                                      <p:to>
+                                        <p:strVal val="visible"/>
+                                      </p:to>
+                                    </p:set>
+                                  </p:childTnLst>
+                                </p:cTn>
+                              </p:par>
+                            </p:childTnLst>
+                          </p:cTn>
+                        </p:par>
+                      </p:childTnLst>
+                    </p:cTn>
+                  </p:par>
+                </p:childTnLst>
+              </p:cTn>
+              <p:prevCondLst>
+                <p:cond evt="onPrev" delay="0">
+                  <p:tgtEl>
+                    <p:sldTgt/>
+                  </p:tgtEl>
+                </p:cond>
+              </p:prevCondLst>
+              <p:nextCondLst>
+                <p:cond evt="onNext" delay="0">
+                  <p:tgtEl>
+                    <p:sldTgt/>
+                  </p:tgtEl>
+                </p:cond>
+              </p:nextCondLst>
+            </p:seq>
+          </p:childTnLst>
+        </p:cTn>
+      </p:par>
+    </p:tnLst>
+    <p:bldLst>
+      <p:bldP spid="11" grpId="0" build="p"/>
+    </p:bldLst>
+  </p:timing>
 </p:sld>
 </file>
 
@@ -12724,6 +14014,137 @@
   <p:clrMapOvr>
     <a:masterClrMapping/>
   </p:clrMapOvr>
+  <p:timing>
+    <p:tnLst>
+      <p:par>
+        <p:cTn id="1" dur="indefinite" restart="never" nodeType="tmRoot">
+          <p:childTnLst>
+            <p:seq concurrent="1" nextAc="seek">
+              <p:cTn id="2" dur="indefinite" nodeType="mainSeq">
+                <p:childTnLst>
+                  <p:par>
+                    <p:cTn id="3" fill="hold">
+                      <p:stCondLst>
+                        <p:cond delay="indefinite"/>
+                      </p:stCondLst>
+                      <p:childTnLst>
+                        <p:par>
+                          <p:cTn id="4" fill="hold">
+                            <p:stCondLst>
+                              <p:cond delay="0"/>
+                            </p:stCondLst>
+                            <p:childTnLst>
+                              <p:par>
+                                <p:cTn id="5" presetID="1" presetClass="entr" presetSubtype="0" fill="hold" grpId="0" nodeType="clickEffect">
+                                  <p:stCondLst>
+                                    <p:cond delay="0"/>
+                                  </p:stCondLst>
+                                  <p:childTnLst>
+                                    <p:set>
+                                      <p:cBhvr>
+                                        <p:cTn id="6" dur="1" fill="hold">
+                                          <p:stCondLst>
+                                            <p:cond delay="0"/>
+                                          </p:stCondLst>
+                                        </p:cTn>
+                                        <p:tgtEl>
+                                          <p:spTgt spid="6">
+                                            <p:txEl>
+                                              <p:pRg st="0" end="0"/>
+                                            </p:txEl>
+                                          </p:spTgt>
+                                        </p:tgtEl>
+                                        <p:attrNameLst>
+                                          <p:attrName>style.visibility</p:attrName>
+                                        </p:attrNameLst>
+                                      </p:cBhvr>
+                                      <p:to>
+                                        <p:strVal val="visible"/>
+                                      </p:to>
+                                    </p:set>
+                                  </p:childTnLst>
+                                </p:cTn>
+                              </p:par>
+                            </p:childTnLst>
+                          </p:cTn>
+                        </p:par>
+                      </p:childTnLst>
+                    </p:cTn>
+                  </p:par>
+                  <p:par>
+                    <p:cTn id="7" fill="hold">
+                      <p:stCondLst>
+                        <p:cond delay="indefinite"/>
+                      </p:stCondLst>
+                      <p:childTnLst>
+                        <p:par>
+                          <p:cTn id="8" fill="hold">
+                            <p:stCondLst>
+                              <p:cond delay="0"/>
+                            </p:stCondLst>
+                            <p:childTnLst>
+                              <p:par>
+                                <p:cTn id="9" presetID="1" presetClass="entr" presetSubtype="0" fill="hold" grpId="0" nodeType="clickEffect">
+                                  <p:stCondLst>
+                                    <p:cond delay="0"/>
+                                  </p:stCondLst>
+                                  <p:childTnLst>
+                                    <p:set>
+                                      <p:cBhvr>
+                                        <p:cTn id="10" dur="1" fill="hold">
+                                          <p:stCondLst>
+                                            <p:cond delay="0"/>
+                                          </p:stCondLst>
+                                        </p:cTn>
+                                        <p:tgtEl>
+                                          <p:spTgt spid="6">
+                                            <p:txEl>
+                                              <p:pRg st="2" end="2"/>
+                                            </p:txEl>
+                                          </p:spTgt>
+                                        </p:tgtEl>
+                                        <p:attrNameLst>
+                                          <p:attrName>style.visibility</p:attrName>
+                                        </p:attrNameLst>
+                                      </p:cBhvr>
+                                      <p:to>
+                                        <p:strVal val="visible"/>
+                                      </p:to>
+                                    </p:set>
+                                  </p:childTnLst>
+                                </p:cTn>
+                              </p:par>
+                            </p:childTnLst>
+                          </p:cTn>
+                        </p:par>
+                      </p:childTnLst>
+                    </p:cTn>
+                  </p:par>
+                </p:childTnLst>
+              </p:cTn>
+              <p:prevCondLst>
+                <p:cond evt="onPrev" delay="0">
+                  <p:tgtEl>
+                    <p:sldTgt/>
+                  </p:tgtEl>
+                </p:cond>
+              </p:prevCondLst>
+              <p:nextCondLst>
+                <p:cond evt="onNext" delay="0">
+                  <p:tgtEl>
+                    <p:sldTgt/>
+                  </p:tgtEl>
+                </p:cond>
+              </p:nextCondLst>
+            </p:seq>
+          </p:childTnLst>
+        </p:cTn>
+      </p:par>
+    </p:tnLst>
+    <p:bldLst>
+      <p:bldP spid="6" grpId="0" build="p"/>
+    </p:bldLst>
+  </p:timing>
 </p:sld>
 </file>
 
@@ -13913,6 +15334,578 @@
   <p:clrMapOvr>
     <a:masterClrMapping/>
   </p:clrMapOvr>
+  <p:timing>
+    <p:tnLst>
+      <p:par>
+        <p:cTn id="1" dur="indefinite" restart="never" nodeType="tmRoot">
+          <p:childTnLst>
+            <p:seq concurrent="1" nextAc="seek">
+              <p:cTn id="2" dur="indefinite" nodeType="mainSeq">
+                <p:childTnLst>
+                  <p:par>
+                    <p:cTn id="3" fill="hold">
+                      <p:stCondLst>
+                        <p:cond delay="indefinite"/>
+                      </p:stCondLst>
+                      <p:childTnLst>
+                        <p:par>
+                          <p:cTn id="4" fill="hold">
+                            <p:stCondLst>
+                              <p:cond delay="0"/>
+                            </p:stCondLst>
+                            <p:childTnLst>
+                              <p:par>
+                                <p:cTn id="5" presetID="1" presetClass="entr" presetSubtype="0" fill="hold" grpId="0" nodeType="clickEffect">
+                                  <p:stCondLst>
+                                    <p:cond delay="0"/>
+                                  </p:stCondLst>
+                                  <p:childTnLst>
+                                    <p:set>
+                                      <p:cBhvr>
+                                        <p:cTn id="6" dur="1" fill="hold">
+                                          <p:stCondLst>
+                                            <p:cond delay="0"/>
+                                          </p:stCondLst>
+                                        </p:cTn>
+                                        <p:tgtEl>
+                                          <p:spTgt spid="7">
+                                            <p:txEl>
+                                              <p:pRg st="0" end="0"/>
+                                            </p:txEl>
+                                          </p:spTgt>
+                                        </p:tgtEl>
+                                        <p:attrNameLst>
+                                          <p:attrName>style.visibility</p:attrName>
+                                        </p:attrNameLst>
+                                      </p:cBhvr>
+                                      <p:to>
+                                        <p:strVal val="visible"/>
+                                      </p:to>
+                                    </p:set>
+                                  </p:childTnLst>
+                                </p:cTn>
+                              </p:par>
+                            </p:childTnLst>
+                          </p:cTn>
+                        </p:par>
+                      </p:childTnLst>
+                    </p:cTn>
+                  </p:par>
+                  <p:par>
+                    <p:cTn id="7" fill="hold">
+                      <p:stCondLst>
+                        <p:cond delay="indefinite"/>
+                      </p:stCondLst>
+                      <p:childTnLst>
+                        <p:par>
+                          <p:cTn id="8" fill="hold">
+                            <p:stCondLst>
+                              <p:cond delay="0"/>
+                            </p:stCondLst>
+                            <p:childTnLst>
+                              <p:par>
+                                <p:cTn id="9" presetID="1" presetClass="entr" presetSubtype="0" fill="hold" grpId="0" nodeType="clickEffect">
+                                  <p:stCondLst>
+                                    <p:cond delay="0"/>
+                                  </p:stCondLst>
+                                  <p:childTnLst>
+                                    <p:set>
+                                      <p:cBhvr>
+                                        <p:cTn id="10" dur="1" fill="hold">
+                                          <p:stCondLst>
+                                            <p:cond delay="0"/>
+                                          </p:stCondLst>
+                                        </p:cTn>
+                                        <p:tgtEl>
+                                          <p:spTgt spid="7">
+                                            <p:txEl>
+                                              <p:pRg st="1" end="1"/>
+                                            </p:txEl>
+                                          </p:spTgt>
+                                        </p:tgtEl>
+                                        <p:attrNameLst>
+                                          <p:attrName>style.visibility</p:attrName>
+                                        </p:attrNameLst>
+                                      </p:cBhvr>
+                                      <p:to>
+                                        <p:strVal val="visible"/>
+                                      </p:to>
+                                    </p:set>
+                                  </p:childTnLst>
+                                </p:cTn>
+                              </p:par>
+                            </p:childTnLst>
+                          </p:cTn>
+                        </p:par>
+                      </p:childTnLst>
+                    </p:cTn>
+                  </p:par>
+                  <p:par>
+                    <p:cTn id="11" fill="hold">
+                      <p:stCondLst>
+                        <p:cond delay="indefinite"/>
+                      </p:stCondLst>
+                      <p:childTnLst>
+                        <p:par>
+                          <p:cTn id="12" fill="hold">
+                            <p:stCondLst>
+                              <p:cond delay="0"/>
+                            </p:stCondLst>
+                            <p:childTnLst>
+                              <p:par>
+                                <p:cTn id="13" presetID="1" presetClass="entr" presetSubtype="0" fill="hold" grpId="0" nodeType="clickEffect">
+                                  <p:stCondLst>
+                                    <p:cond delay="0"/>
+                                  </p:stCondLst>
+                                  <p:childTnLst>
+                                    <p:set>
+                                      <p:cBhvr>
+                                        <p:cTn id="14" dur="1" fill="hold">
+                                          <p:stCondLst>
+                                            <p:cond delay="0"/>
+                                          </p:stCondLst>
+                                        </p:cTn>
+                                        <p:tgtEl>
+                                          <p:spTgt spid="7">
+                                            <p:txEl>
+                                              <p:pRg st="2" end="2"/>
+                                            </p:txEl>
+                                          </p:spTgt>
+                                        </p:tgtEl>
+                                        <p:attrNameLst>
+                                          <p:attrName>style.visibility</p:attrName>
+                                        </p:attrNameLst>
+                                      </p:cBhvr>
+                                      <p:to>
+                                        <p:strVal val="visible"/>
+                                      </p:to>
+                                    </p:set>
+                                  </p:childTnLst>
+                                </p:cTn>
+                              </p:par>
+                            </p:childTnLst>
+                          </p:cTn>
+                        </p:par>
+                      </p:childTnLst>
+                    </p:cTn>
+                  </p:par>
+                  <p:par>
+                    <p:cTn id="15" fill="hold">
+                      <p:stCondLst>
+                        <p:cond delay="indefinite"/>
+                      </p:stCondLst>
+                      <p:childTnLst>
+                        <p:par>
+                          <p:cTn id="16" fill="hold">
+                            <p:stCondLst>
+                              <p:cond delay="0"/>
+                            </p:stCondLst>
+                            <p:childTnLst>
+                              <p:par>
+                                <p:cTn id="17" presetID="1" presetClass="entr" presetSubtype="0" fill="hold" grpId="0" nodeType="clickEffect">
+                                  <p:stCondLst>
+                                    <p:cond delay="0"/>
+                                  </p:stCondLst>
+                                  <p:childTnLst>
+                                    <p:set>
+                                      <p:cBhvr>
+                                        <p:cTn id="18" dur="1" fill="hold">
+                                          <p:stCondLst>
+                                            <p:cond delay="0"/>
+                                          </p:stCondLst>
+                                        </p:cTn>
+                                        <p:tgtEl>
+                                          <p:spTgt spid="7">
+                                            <p:txEl>
+                                              <p:pRg st="3" end="3"/>
+                                            </p:txEl>
+                                          </p:spTgt>
+                                        </p:tgtEl>
+                                        <p:attrNameLst>
+                                          <p:attrName>style.visibility</p:attrName>
+                                        </p:attrNameLst>
+                                      </p:cBhvr>
+                                      <p:to>
+                                        <p:strVal val="visible"/>
+                                      </p:to>
+                                    </p:set>
+                                  </p:childTnLst>
+                                </p:cTn>
+                              </p:par>
+                            </p:childTnLst>
+                          </p:cTn>
+                        </p:par>
+                      </p:childTnLst>
+                    </p:cTn>
+                  </p:par>
+                  <p:par>
+                    <p:cTn id="19" fill="hold">
+                      <p:stCondLst>
+                        <p:cond delay="indefinite"/>
+                      </p:stCondLst>
+                      <p:childTnLst>
+                        <p:par>
+                          <p:cTn id="20" fill="hold">
+                            <p:stCondLst>
+                              <p:cond delay="0"/>
+                            </p:stCondLst>
+                            <p:childTnLst>
+                              <p:par>
+                                <p:cTn id="21" presetID="1" presetClass="entr" presetSubtype="0" fill="hold" grpId="0" nodeType="clickEffect">
+                                  <p:stCondLst>
+                                    <p:cond delay="0"/>
+                                  </p:stCondLst>
+                                  <p:childTnLst>
+                                    <p:set>
+                                      <p:cBhvr>
+                                        <p:cTn id="22" dur="1" fill="hold">
+                                          <p:stCondLst>
+                                            <p:cond delay="0"/>
+                                          </p:stCondLst>
+                                        </p:cTn>
+                                        <p:tgtEl>
+                                          <p:spTgt spid="7">
+                                            <p:txEl>
+                                              <p:pRg st="4" end="4"/>
+                                            </p:txEl>
+                                          </p:spTgt>
+                                        </p:tgtEl>
+                                        <p:attrNameLst>
+                                          <p:attrName>style.visibility</p:attrName>
+                                        </p:attrNameLst>
+                                      </p:cBhvr>
+                                      <p:to>
+                                        <p:strVal val="visible"/>
+                                      </p:to>
+                                    </p:set>
+                                  </p:childTnLst>
+                                </p:cTn>
+                              </p:par>
+                            </p:childTnLst>
+                          </p:cTn>
+                        </p:par>
+                      </p:childTnLst>
+                    </p:cTn>
+                  </p:par>
+                  <p:par>
+                    <p:cTn id="23" fill="hold">
+                      <p:stCondLst>
+                        <p:cond delay="indefinite"/>
+                      </p:stCondLst>
+                      <p:childTnLst>
+                        <p:par>
+                          <p:cTn id="24" fill="hold">
+                            <p:stCondLst>
+                              <p:cond delay="0"/>
+                            </p:stCondLst>
+                            <p:childTnLst>
+                              <p:par>
+                                <p:cTn id="25" presetID="1" presetClass="entr" presetSubtype="0" fill="hold" grpId="0" nodeType="clickEffect">
+                                  <p:stCondLst>
+                                    <p:cond delay="0"/>
+                                  </p:stCondLst>
+                                  <p:childTnLst>
+                                    <p:set>
+                                      <p:cBhvr>
+                                        <p:cTn id="26" dur="1" fill="hold">
+                                          <p:stCondLst>
+                                            <p:cond delay="0"/>
+                                          </p:stCondLst>
+                                        </p:cTn>
+                                        <p:tgtEl>
+                                          <p:spTgt spid="7">
+                                            <p:txEl>
+                                              <p:pRg st="5" end="5"/>
+                                            </p:txEl>
+                                          </p:spTgt>
+                                        </p:tgtEl>
+                                        <p:attrNameLst>
+                                          <p:attrName>style.visibility</p:attrName>
+                                        </p:attrNameLst>
+                                      </p:cBhvr>
+                                      <p:to>
+                                        <p:strVal val="visible"/>
+                                      </p:to>
+                                    </p:set>
+                                  </p:childTnLst>
+                                </p:cTn>
+                              </p:par>
+                            </p:childTnLst>
+                          </p:cTn>
+                        </p:par>
+                      </p:childTnLst>
+                    </p:cTn>
+                  </p:par>
+                  <p:par>
+                    <p:cTn id="27" fill="hold">
+                      <p:stCondLst>
+                        <p:cond delay="indefinite"/>
+                      </p:stCondLst>
+                      <p:childTnLst>
+                        <p:par>
+                          <p:cTn id="28" fill="hold">
+                            <p:stCondLst>
+                              <p:cond delay="0"/>
+                            </p:stCondLst>
+                            <p:childTnLst>
+                              <p:par>
+                                <p:cTn id="29" presetID="1" presetClass="entr" presetSubtype="0" fill="hold" grpId="0" nodeType="clickEffect">
+                                  <p:stCondLst>
+                                    <p:cond delay="0"/>
+                                  </p:stCondLst>
+                                  <p:childTnLst>
+                                    <p:set>
+                                      <p:cBhvr>
+                                        <p:cTn id="30" dur="1" fill="hold">
+                                          <p:stCondLst>
+                                            <p:cond delay="0"/>
+                                          </p:stCondLst>
+                                        </p:cTn>
+                                        <p:tgtEl>
+                                          <p:spTgt spid="7">
+                                            <p:txEl>
+                                              <p:pRg st="6" end="6"/>
+                                            </p:txEl>
+                                          </p:spTgt>
+                                        </p:tgtEl>
+                                        <p:attrNameLst>
+                                          <p:attrName>style.visibility</p:attrName>
+                                        </p:attrNameLst>
+                                      </p:cBhvr>
+                                      <p:to>
+                                        <p:strVal val="visible"/>
+                                      </p:to>
+                                    </p:set>
+                                  </p:childTnLst>
+                                </p:cTn>
+                              </p:par>
+                            </p:childTnLst>
+                          </p:cTn>
+                        </p:par>
+                      </p:childTnLst>
+                    </p:cTn>
+                  </p:par>
+                  <p:par>
+                    <p:cTn id="31" fill="hold">
+                      <p:stCondLst>
+                        <p:cond delay="indefinite"/>
+                      </p:stCondLst>
+                      <p:childTnLst>
+                        <p:par>
+                          <p:cTn id="32" fill="hold">
+                            <p:stCondLst>
+                              <p:cond delay="0"/>
+                            </p:stCondLst>
+                            <p:childTnLst>
+                              <p:par>
+                                <p:cTn id="33" presetID="1" presetClass="entr" presetSubtype="0" fill="hold" grpId="0" nodeType="clickEffect">
+                                  <p:stCondLst>
+                                    <p:cond delay="0"/>
+                                  </p:stCondLst>
+                                  <p:childTnLst>
+                                    <p:set>
+                                      <p:cBhvr>
+                                        <p:cTn id="34" dur="1" fill="hold">
+                                          <p:stCondLst>
+                                            <p:cond delay="0"/>
+                                          </p:stCondLst>
+                                        </p:cTn>
+                                        <p:tgtEl>
+                                          <p:spTgt spid="7">
+                                            <p:txEl>
+                                              <p:pRg st="7" end="7"/>
+                                            </p:txEl>
+                                          </p:spTgt>
+                                        </p:tgtEl>
+                                        <p:attrNameLst>
+                                          <p:attrName>style.visibility</p:attrName>
+                                        </p:attrNameLst>
+                                      </p:cBhvr>
+                                      <p:to>
+                                        <p:strVal val="visible"/>
+                                      </p:to>
+                                    </p:set>
+                                  </p:childTnLst>
+                                </p:cTn>
+                              </p:par>
+                            </p:childTnLst>
+                          </p:cTn>
+                        </p:par>
+                      </p:childTnLst>
+                    </p:cTn>
+                  </p:par>
+                  <p:par>
+                    <p:cTn id="35" fill="hold">
+                      <p:stCondLst>
+                        <p:cond delay="indefinite"/>
+                      </p:stCondLst>
+                      <p:childTnLst>
+                        <p:par>
+                          <p:cTn id="36" fill="hold">
+                            <p:stCondLst>
+                              <p:cond delay="0"/>
+                            </p:stCondLst>
+                            <p:childTnLst>
+                              <p:par>
+                                <p:cTn id="37" presetID="1" presetClass="entr" presetSubtype="0" fill="hold" grpId="0" nodeType="clickEffect">
+                                  <p:stCondLst>
+                                    <p:cond delay="0"/>
+                                  </p:stCondLst>
+                                  <p:childTnLst>
+                                    <p:set>
+                                      <p:cBhvr>
+                                        <p:cTn id="38" dur="1" fill="hold">
+                                          <p:stCondLst>
+                                            <p:cond delay="0"/>
+                                          </p:stCondLst>
+                                        </p:cTn>
+                                        <p:tgtEl>
+                                          <p:spTgt spid="7">
+                                            <p:txEl>
+                                              <p:pRg st="8" end="8"/>
+                                            </p:txEl>
+                                          </p:spTgt>
+                                        </p:tgtEl>
+                                        <p:attrNameLst>
+                                          <p:attrName>style.visibility</p:attrName>
+                                        </p:attrNameLst>
+                                      </p:cBhvr>
+                                      <p:to>
+                                        <p:strVal val="visible"/>
+                                      </p:to>
+                                    </p:set>
+                                  </p:childTnLst>
+                                </p:cTn>
+                              </p:par>
+                            </p:childTnLst>
+                          </p:cTn>
+                        </p:par>
+                      </p:childTnLst>
+                    </p:cTn>
+                  </p:par>
+                  <p:par>
+                    <p:cTn id="39" fill="hold">
+                      <p:stCondLst>
+                        <p:cond delay="indefinite"/>
+                      </p:stCondLst>
+                      <p:childTnLst>
+                        <p:par>
+                          <p:cTn id="40" fill="hold">
+                            <p:stCondLst>
+                              <p:cond delay="0"/>
+                            </p:stCondLst>
+                            <p:childTnLst>
+                              <p:par>
+                                <p:cTn id="41" presetID="1" presetClass="entr" presetSubtype="0" fill="hold" grpId="0" nodeType="clickEffect">
+                                  <p:stCondLst>
+                                    <p:cond delay="0"/>
+                                  </p:stCondLst>
+                                  <p:childTnLst>
+                                    <p:set>
+                                      <p:cBhvr>
+                                        <p:cTn id="42" dur="1" fill="hold">
+                                          <p:stCondLst>
+                                            <p:cond delay="0"/>
+                                          </p:stCondLst>
+                                        </p:cTn>
+                                        <p:tgtEl>
+                                          <p:spTgt spid="7">
+                                            <p:txEl>
+                                              <p:pRg st="9" end="9"/>
+                                            </p:txEl>
+                                          </p:spTgt>
+                                        </p:tgtEl>
+                                        <p:attrNameLst>
+                                          <p:attrName>style.visibility</p:attrName>
+                                        </p:attrNameLst>
+                                      </p:cBhvr>
+                                      <p:to>
+                                        <p:strVal val="visible"/>
+                                      </p:to>
+                                    </p:set>
+                                  </p:childTnLst>
+                                </p:cTn>
+                              </p:par>
+                            </p:childTnLst>
+                          </p:cTn>
+                        </p:par>
+                      </p:childTnLst>
+                    </p:cTn>
+                  </p:par>
+                  <p:par>
+                    <p:cTn id="43" fill="hold">
+                      <p:stCondLst>
+                        <p:cond delay="indefinite"/>
+                      </p:stCondLst>
+                      <p:childTnLst>
+                        <p:par>
+                          <p:cTn id="44" fill="hold">
+                            <p:stCondLst>
+                              <p:cond delay="0"/>
+                            </p:stCondLst>
+                            <p:childTnLst>
+                              <p:par>
+                                <p:cTn id="45" presetID="1" presetClass="entr" presetSubtype="0" fill="hold" grpId="0" nodeType="clickEffect">
+                                  <p:stCondLst>
+                                    <p:cond delay="0"/>
+                                  </p:stCondLst>
+                                  <p:childTnLst>
+                                    <p:set>
+                                      <p:cBhvr>
+                                        <p:cTn id="46" dur="1" fill="hold">
+                                          <p:stCondLst>
+                                            <p:cond delay="0"/>
+                                          </p:stCondLst>
+                                        </p:cTn>
+                                        <p:tgtEl>
+                                          <p:spTgt spid="7">
+                                            <p:txEl>
+                                              <p:pRg st="10" end="10"/>
+                                            </p:txEl>
+                                          </p:spTgt>
+                                        </p:tgtEl>
+                                        <p:attrNameLst>
+                                          <p:attrName>style.visibility</p:attrName>
+                                        </p:attrNameLst>
+                                      </p:cBhvr>
+                                      <p:to>
+                                        <p:strVal val="visible"/>
+                                      </p:to>
+                                    </p:set>
+                                  </p:childTnLst>
+                                </p:cTn>
+                              </p:par>
+                            </p:childTnLst>
+                          </p:cTn>
+                        </p:par>
+                      </p:childTnLst>
+                    </p:cTn>
+                  </p:par>
+                </p:childTnLst>
+              </p:cTn>
+              <p:prevCondLst>
+                <p:cond evt="onPrev" delay="0">
+                  <p:tgtEl>
+                    <p:sldTgt/>
+                  </p:tgtEl>
+                </p:cond>
+              </p:prevCondLst>
+              <p:nextCondLst>
+                <p:cond evt="onNext" delay="0">
+                  <p:tgtEl>
+                    <p:sldTgt/>
+                  </p:tgtEl>
+                </p:cond>
+              </p:nextCondLst>
+            </p:seq>
+          </p:childTnLst>
+        </p:cTn>
+      </p:par>
+    </p:tnLst>
+    <p:bldLst>
+      <p:bldP spid="7" grpId="0" build="p"/>
+    </p:bldLst>
+  </p:timing>
 </p:sld>
 </file>
 
@@ -14164,6 +16157,284 @@
   <p:clrMapOvr>
     <a:masterClrMapping/>
   </p:clrMapOvr>
+  <p:timing>
+    <p:tnLst>
+      <p:par>
+        <p:cTn id="1" dur="indefinite" restart="never" nodeType="tmRoot">
+          <p:childTnLst>
+            <p:seq concurrent="1" nextAc="seek">
+              <p:cTn id="2" dur="indefinite" nodeType="mainSeq">
+                <p:childTnLst>
+                  <p:par>
+                    <p:cTn id="3" fill="hold">
+                      <p:stCondLst>
+                        <p:cond delay="indefinite"/>
+                      </p:stCondLst>
+                      <p:childTnLst>
+                        <p:par>
+                          <p:cTn id="4" fill="hold">
+                            <p:stCondLst>
+                              <p:cond delay="0"/>
+                            </p:stCondLst>
+                            <p:childTnLst>
+                              <p:par>
+                                <p:cTn id="5" presetID="1" presetClass="entr" presetSubtype="0" fill="hold" grpId="0" nodeType="clickEffect">
+                                  <p:stCondLst>
+                                    <p:cond delay="0"/>
+                                  </p:stCondLst>
+                                  <p:childTnLst>
+                                    <p:set>
+                                      <p:cBhvr>
+                                        <p:cTn id="6" dur="1" fill="hold">
+                                          <p:stCondLst>
+                                            <p:cond delay="0"/>
+                                          </p:stCondLst>
+                                        </p:cTn>
+                                        <p:tgtEl>
+                                          <p:spTgt spid="10">
+                                            <p:txEl>
+                                              <p:pRg st="0" end="0"/>
+                                            </p:txEl>
+                                          </p:spTgt>
+                                        </p:tgtEl>
+                                        <p:attrNameLst>
+                                          <p:attrName>style.visibility</p:attrName>
+                                        </p:attrNameLst>
+                                      </p:cBhvr>
+                                      <p:to>
+                                        <p:strVal val="visible"/>
+                                      </p:to>
+                                    </p:set>
+                                  </p:childTnLst>
+                                </p:cTn>
+                              </p:par>
+                            </p:childTnLst>
+                          </p:cTn>
+                        </p:par>
+                      </p:childTnLst>
+                    </p:cTn>
+                  </p:par>
+                  <p:par>
+                    <p:cTn id="7" fill="hold">
+                      <p:stCondLst>
+                        <p:cond delay="indefinite"/>
+                      </p:stCondLst>
+                      <p:childTnLst>
+                        <p:par>
+                          <p:cTn id="8" fill="hold">
+                            <p:stCondLst>
+                              <p:cond delay="0"/>
+                            </p:stCondLst>
+                            <p:childTnLst>
+                              <p:par>
+                                <p:cTn id="9" presetID="1" presetClass="entr" presetSubtype="0" fill="hold" grpId="0" nodeType="clickEffect">
+                                  <p:stCondLst>
+                                    <p:cond delay="0"/>
+                                  </p:stCondLst>
+                                  <p:childTnLst>
+                                    <p:set>
+                                      <p:cBhvr>
+                                        <p:cTn id="10" dur="1" fill="hold">
+                                          <p:stCondLst>
+                                            <p:cond delay="0"/>
+                                          </p:stCondLst>
+                                        </p:cTn>
+                                        <p:tgtEl>
+                                          <p:spTgt spid="10">
+                                            <p:txEl>
+                                              <p:pRg st="1" end="1"/>
+                                            </p:txEl>
+                                          </p:spTgt>
+                                        </p:tgtEl>
+                                        <p:attrNameLst>
+                                          <p:attrName>style.visibility</p:attrName>
+                                        </p:attrNameLst>
+                                      </p:cBhvr>
+                                      <p:to>
+                                        <p:strVal val="visible"/>
+                                      </p:to>
+                                    </p:set>
+                                  </p:childTnLst>
+                                </p:cTn>
+                              </p:par>
+                            </p:childTnLst>
+                          </p:cTn>
+                        </p:par>
+                      </p:childTnLst>
+                    </p:cTn>
+                  </p:par>
+                  <p:par>
+                    <p:cTn id="11" fill="hold">
+                      <p:stCondLst>
+                        <p:cond delay="indefinite"/>
+                      </p:stCondLst>
+                      <p:childTnLst>
+                        <p:par>
+                          <p:cTn id="12" fill="hold">
+                            <p:stCondLst>
+                              <p:cond delay="0"/>
+                            </p:stCondLst>
+                            <p:childTnLst>
+                              <p:par>
+                                <p:cTn id="13" presetID="1" presetClass="entr" presetSubtype="0" fill="hold" grpId="0" nodeType="clickEffect">
+                                  <p:stCondLst>
+                                    <p:cond delay="0"/>
+                                  </p:stCondLst>
+                                  <p:childTnLst>
+                                    <p:set>
+                                      <p:cBhvr>
+                                        <p:cTn id="14" dur="1" fill="hold">
+                                          <p:stCondLst>
+                                            <p:cond delay="0"/>
+                                          </p:stCondLst>
+                                        </p:cTn>
+                                        <p:tgtEl>
+                                          <p:spTgt spid="10">
+                                            <p:txEl>
+                                              <p:pRg st="2" end="2"/>
+                                            </p:txEl>
+                                          </p:spTgt>
+                                        </p:tgtEl>
+                                        <p:attrNameLst>
+                                          <p:attrName>style.visibility</p:attrName>
+                                        </p:attrNameLst>
+                                      </p:cBhvr>
+                                      <p:to>
+                                        <p:strVal val="visible"/>
+                                      </p:to>
+                                    </p:set>
+                                  </p:childTnLst>
+                                </p:cTn>
+                              </p:par>
+                            </p:childTnLst>
+                          </p:cTn>
+                        </p:par>
+                      </p:childTnLst>
+                    </p:cTn>
+                  </p:par>
+                  <p:par>
+                    <p:cTn id="15" fill="hold">
+                      <p:stCondLst>
+                        <p:cond delay="indefinite"/>
+                      </p:stCondLst>
+                      <p:childTnLst>
+                        <p:par>
+                          <p:cTn id="16" fill="hold">
+                            <p:stCondLst>
+                              <p:cond delay="0"/>
+                            </p:stCondLst>
+                            <p:childTnLst>
+                              <p:par>
+                                <p:cTn id="17" presetID="1" presetClass="entr" presetSubtype="0" fill="hold" grpId="0" nodeType="clickEffect">
+                                  <p:stCondLst>
+                                    <p:cond delay="0"/>
+                                  </p:stCondLst>
+                                  <p:childTnLst>
+                                    <p:set>
+                                      <p:cBhvr>
+                                        <p:cTn id="18" dur="1" fill="hold">
+                                          <p:stCondLst>
+                                            <p:cond delay="0"/>
+                                          </p:stCondLst>
+                                        </p:cTn>
+                                        <p:tgtEl>
+                                          <p:spTgt spid="10">
+                                            <p:txEl>
+                                              <p:pRg st="3" end="3"/>
+                                            </p:txEl>
+                                          </p:spTgt>
+                                        </p:tgtEl>
+                                        <p:attrNameLst>
+                                          <p:attrName>style.visibility</p:attrName>
+                                        </p:attrNameLst>
+                                      </p:cBhvr>
+                                      <p:to>
+                                        <p:strVal val="visible"/>
+                                      </p:to>
+                                    </p:set>
+                                  </p:childTnLst>
+                                </p:cTn>
+                              </p:par>
+                            </p:childTnLst>
+                          </p:cTn>
+                        </p:par>
+                      </p:childTnLst>
+                    </p:cTn>
+                  </p:par>
+                  <p:par>
+                    <p:cTn id="19" fill="hold">
+                      <p:stCondLst>
+                        <p:cond delay="indefinite"/>
+                      </p:stCondLst>
+                      <p:childTnLst>
+                        <p:par>
+                          <p:cTn id="20" fill="hold">
+                            <p:stCondLst>
+                              <p:cond delay="0"/>
+                            </p:stCondLst>
+                            <p:childTnLst>
+                              <p:par>
+                                <p:cTn id="21" presetID="1" presetClass="entr" presetSubtype="0" fill="hold" grpId="0" nodeType="clickEffect">
+                                  <p:stCondLst>
+                                    <p:cond delay="0"/>
+                                  </p:stCondLst>
+                                  <p:childTnLst>
+                                    <p:set>
+                                      <p:cBhvr>
+                                        <p:cTn id="22" dur="1" fill="hold">
+                                          <p:stCondLst>
+                                            <p:cond delay="0"/>
+                                          </p:stCondLst>
+                                        </p:cTn>
+                                        <p:tgtEl>
+                                          <p:spTgt spid="10">
+                                            <p:txEl>
+                                              <p:pRg st="4" end="4"/>
+                                            </p:txEl>
+                                          </p:spTgt>
+                                        </p:tgtEl>
+                                        <p:attrNameLst>
+                                          <p:attrName>style.visibility</p:attrName>
+                                        </p:attrNameLst>
+                                      </p:cBhvr>
+                                      <p:to>
+                                        <p:strVal val="visible"/>
+                                      </p:to>
+                                    </p:set>
+                                  </p:childTnLst>
+                                </p:cTn>
+                              </p:par>
+                            </p:childTnLst>
+                          </p:cTn>
+                        </p:par>
+                      </p:childTnLst>
+                    </p:cTn>
+                  </p:par>
+                </p:childTnLst>
+              </p:cTn>
+              <p:prevCondLst>
+                <p:cond evt="onPrev" delay="0">
+                  <p:tgtEl>
+                    <p:sldTgt/>
+                  </p:tgtEl>
+                </p:cond>
+              </p:prevCondLst>
+              <p:nextCondLst>
+                <p:cond evt="onNext" delay="0">
+                  <p:tgtEl>
+                    <p:sldTgt/>
+                  </p:tgtEl>
+                </p:cond>
+              </p:nextCondLst>
+            </p:seq>
+          </p:childTnLst>
+        </p:cTn>
+      </p:par>
+    </p:tnLst>
+    <p:bldLst>
+      <p:bldP spid="10" grpId="0" build="p"/>
+    </p:bldLst>
+  </p:timing>
 </p:sld>
 </file>
 
@@ -14575,6 +16846,325 @@
   <p:clrMapOvr>
     <a:masterClrMapping/>
   </p:clrMapOvr>
+  <p:timing>
+    <p:tnLst>
+      <p:par>
+        <p:cTn id="1" dur="indefinite" restart="never" nodeType="tmRoot">
+          <p:childTnLst>
+            <p:seq concurrent="1" nextAc="seek">
+              <p:cTn id="2" dur="indefinite" nodeType="mainSeq">
+                <p:childTnLst>
+                  <p:par>
+                    <p:cTn id="3" fill="hold">
+                      <p:stCondLst>
+                        <p:cond delay="indefinite"/>
+                      </p:stCondLst>
+                      <p:childTnLst>
+                        <p:par>
+                          <p:cTn id="4" fill="hold">
+                            <p:stCondLst>
+                              <p:cond delay="0"/>
+                            </p:stCondLst>
+                            <p:childTnLst>
+                              <p:par>
+                                <p:cTn id="5" presetID="1" presetClass="entr" presetSubtype="0" fill="hold" nodeType="clickEffect">
+                                  <p:stCondLst>
+                                    <p:cond delay="0"/>
+                                  </p:stCondLst>
+                                  <p:childTnLst>
+                                    <p:set>
+                                      <p:cBhvr>
+                                        <p:cTn id="6" dur="1" fill="hold">
+                                          <p:stCondLst>
+                                            <p:cond delay="0"/>
+                                          </p:stCondLst>
+                                        </p:cTn>
+                                        <p:tgtEl>
+                                          <p:spTgt spid="8">
+                                            <p:txEl>
+                                              <p:pRg st="0" end="0"/>
+                                            </p:txEl>
+                                          </p:spTgt>
+                                        </p:tgtEl>
+                                        <p:attrNameLst>
+                                          <p:attrName>style.visibility</p:attrName>
+                                        </p:attrNameLst>
+                                      </p:cBhvr>
+                                      <p:to>
+                                        <p:strVal val="visible"/>
+                                      </p:to>
+                                    </p:set>
+                                  </p:childTnLst>
+                                </p:cTn>
+                              </p:par>
+                              <p:par>
+                                <p:cTn id="7" presetID="1" presetClass="entr" presetSubtype="0" fill="hold" nodeType="withEffect">
+                                  <p:stCondLst>
+                                    <p:cond delay="0"/>
+                                  </p:stCondLst>
+                                  <p:childTnLst>
+                                    <p:set>
+                                      <p:cBhvr>
+                                        <p:cTn id="8" dur="1" fill="hold">
+                                          <p:stCondLst>
+                                            <p:cond delay="0"/>
+                                          </p:stCondLst>
+                                        </p:cTn>
+                                        <p:tgtEl>
+                                          <p:spTgt spid="8">
+                                            <p:txEl>
+                                              <p:pRg st="2" end="2"/>
+                                            </p:txEl>
+                                          </p:spTgt>
+                                        </p:tgtEl>
+                                        <p:attrNameLst>
+                                          <p:attrName>style.visibility</p:attrName>
+                                        </p:attrNameLst>
+                                      </p:cBhvr>
+                                      <p:to>
+                                        <p:strVal val="visible"/>
+                                      </p:to>
+                                    </p:set>
+                                  </p:childTnLst>
+                                </p:cTn>
+                              </p:par>
+                            </p:childTnLst>
+                          </p:cTn>
+                        </p:par>
+                      </p:childTnLst>
+                    </p:cTn>
+                  </p:par>
+                  <p:par>
+                    <p:cTn id="9" fill="hold">
+                      <p:stCondLst>
+                        <p:cond delay="indefinite"/>
+                      </p:stCondLst>
+                      <p:childTnLst>
+                        <p:par>
+                          <p:cTn id="10" fill="hold">
+                            <p:stCondLst>
+                              <p:cond delay="0"/>
+                            </p:stCondLst>
+                            <p:childTnLst>
+                              <p:par>
+                                <p:cTn id="11" presetID="1" presetClass="entr" presetSubtype="0" fill="hold" nodeType="clickEffect">
+                                  <p:stCondLst>
+                                    <p:cond delay="0"/>
+                                  </p:stCondLst>
+                                  <p:childTnLst>
+                                    <p:set>
+                                      <p:cBhvr>
+                                        <p:cTn id="12" dur="1" fill="hold">
+                                          <p:stCondLst>
+                                            <p:cond delay="0"/>
+                                          </p:stCondLst>
+                                        </p:cTn>
+                                        <p:tgtEl>
+                                          <p:spTgt spid="8">
+                                            <p:txEl>
+                                              <p:pRg st="4" end="4"/>
+                                            </p:txEl>
+                                          </p:spTgt>
+                                        </p:tgtEl>
+                                        <p:attrNameLst>
+                                          <p:attrName>style.visibility</p:attrName>
+                                        </p:attrNameLst>
+                                      </p:cBhvr>
+                                      <p:to>
+                                        <p:strVal val="visible"/>
+                                      </p:to>
+                                    </p:set>
+                                  </p:childTnLst>
+                                </p:cTn>
+                              </p:par>
+                              <p:par>
+                                <p:cTn id="13" presetID="1" presetClass="entr" presetSubtype="0" fill="hold" nodeType="withEffect">
+                                  <p:stCondLst>
+                                    <p:cond delay="0"/>
+                                  </p:stCondLst>
+                                  <p:childTnLst>
+                                    <p:set>
+                                      <p:cBhvr>
+                                        <p:cTn id="14" dur="1" fill="hold">
+                                          <p:stCondLst>
+                                            <p:cond delay="0"/>
+                                          </p:stCondLst>
+                                        </p:cTn>
+                                        <p:tgtEl>
+                                          <p:spTgt spid="8">
+                                            <p:txEl>
+                                              <p:pRg st="6" end="6"/>
+                                            </p:txEl>
+                                          </p:spTgt>
+                                        </p:tgtEl>
+                                        <p:attrNameLst>
+                                          <p:attrName>style.visibility</p:attrName>
+                                        </p:attrNameLst>
+                                      </p:cBhvr>
+                                      <p:to>
+                                        <p:strVal val="visible"/>
+                                      </p:to>
+                                    </p:set>
+                                  </p:childTnLst>
+                                </p:cTn>
+                              </p:par>
+                            </p:childTnLst>
+                          </p:cTn>
+                        </p:par>
+                      </p:childTnLst>
+                    </p:cTn>
+                  </p:par>
+                  <p:par>
+                    <p:cTn id="15" fill="hold">
+                      <p:stCondLst>
+                        <p:cond delay="indefinite"/>
+                      </p:stCondLst>
+                      <p:childTnLst>
+                        <p:par>
+                          <p:cTn id="16" fill="hold">
+                            <p:stCondLst>
+                              <p:cond delay="0"/>
+                            </p:stCondLst>
+                            <p:childTnLst>
+                              <p:par>
+                                <p:cTn id="17" presetID="1" presetClass="entr" presetSubtype="0" fill="hold" nodeType="clickEffect">
+                                  <p:stCondLst>
+                                    <p:cond delay="0"/>
+                                  </p:stCondLst>
+                                  <p:childTnLst>
+                                    <p:set>
+                                      <p:cBhvr>
+                                        <p:cTn id="18" dur="1" fill="hold">
+                                          <p:stCondLst>
+                                            <p:cond delay="0"/>
+                                          </p:stCondLst>
+                                        </p:cTn>
+                                        <p:tgtEl>
+                                          <p:spTgt spid="8">
+                                            <p:txEl>
+                                              <p:pRg st="8" end="8"/>
+                                            </p:txEl>
+                                          </p:spTgt>
+                                        </p:tgtEl>
+                                        <p:attrNameLst>
+                                          <p:attrName>style.visibility</p:attrName>
+                                        </p:attrNameLst>
+                                      </p:cBhvr>
+                                      <p:to>
+                                        <p:strVal val="visible"/>
+                                      </p:to>
+                                    </p:set>
+                                  </p:childTnLst>
+                                </p:cTn>
+                              </p:par>
+                              <p:par>
+                                <p:cTn id="19" presetID="1" presetClass="entr" presetSubtype="0" fill="hold" nodeType="withEffect">
+                                  <p:stCondLst>
+                                    <p:cond delay="0"/>
+                                  </p:stCondLst>
+                                  <p:childTnLst>
+                                    <p:set>
+                                      <p:cBhvr>
+                                        <p:cTn id="20" dur="1" fill="hold">
+                                          <p:stCondLst>
+                                            <p:cond delay="0"/>
+                                          </p:stCondLst>
+                                        </p:cTn>
+                                        <p:tgtEl>
+                                          <p:spTgt spid="8">
+                                            <p:txEl>
+                                              <p:pRg st="10" end="10"/>
+                                            </p:txEl>
+                                          </p:spTgt>
+                                        </p:tgtEl>
+                                        <p:attrNameLst>
+                                          <p:attrName>style.visibility</p:attrName>
+                                        </p:attrNameLst>
+                                      </p:cBhvr>
+                                      <p:to>
+                                        <p:strVal val="visible"/>
+                                      </p:to>
+                                    </p:set>
+                                  </p:childTnLst>
+                                </p:cTn>
+                              </p:par>
+                            </p:childTnLst>
+                          </p:cTn>
+                        </p:par>
+                      </p:childTnLst>
+                    </p:cTn>
+                  </p:par>
+                  <p:par>
+                    <p:cTn id="21" fill="hold">
+                      <p:stCondLst>
+                        <p:cond delay="indefinite"/>
+                      </p:stCondLst>
+                      <p:childTnLst>
+                        <p:par>
+                          <p:cTn id="22" fill="hold">
+                            <p:stCondLst>
+                              <p:cond delay="0"/>
+                            </p:stCondLst>
+                            <p:childTnLst>
+                              <p:par>
+                                <p:cTn id="23" presetID="1" presetClass="entr" presetSubtype="0" fill="hold" nodeType="clickEffect">
+                                  <p:stCondLst>
+                                    <p:cond delay="0"/>
+                                  </p:stCondLst>
+                                  <p:childTnLst>
+                                    <p:set>
+                                      <p:cBhvr>
+                                        <p:cTn id="24" dur="1" fill="hold">
+                                          <p:stCondLst>
+                                            <p:cond delay="0"/>
+                                          </p:stCondLst>
+                                        </p:cTn>
+                                        <p:tgtEl>
+                                          <p:spTgt spid="8">
+                                            <p:txEl>
+                                              <p:pRg st="12" end="12"/>
+                                            </p:txEl>
+                                          </p:spTgt>
+                                        </p:tgtEl>
+                                        <p:attrNameLst>
+                                          <p:attrName>style.visibility</p:attrName>
+                                        </p:attrNameLst>
+                                      </p:cBhvr>
+                                      <p:to>
+                                        <p:strVal val="visible"/>
+                                      </p:to>
+                                    </p:set>
+                                  </p:childTnLst>
+                                </p:cTn>
+                              </p:par>
+                            </p:childTnLst>
+                          </p:cTn>
+                        </p:par>
+                      </p:childTnLst>
+                    </p:cTn>
+                  </p:par>
+                </p:childTnLst>
+              </p:cTn>
+              <p:prevCondLst>
+                <p:cond evt="onPrev" delay="0">
+                  <p:tgtEl>
+                    <p:sldTgt/>
+                  </p:tgtEl>
+                </p:cond>
+              </p:prevCondLst>
+              <p:nextCondLst>
+                <p:cond evt="onNext" delay="0">
+                  <p:tgtEl>
+                    <p:sldTgt/>
+                  </p:tgtEl>
+                </p:cond>
+              </p:nextCondLst>
+            </p:seq>
+          </p:childTnLst>
+        </p:cTn>
+      </p:par>
+    </p:tnLst>
+  </p:timing>
 </p:sld>
 </file>
 
@@ -14974,6 +17564,325 @@
   <p:clrMapOvr>
     <a:masterClrMapping/>
   </p:clrMapOvr>
+  <p:timing>
+    <p:tnLst>
+      <p:par>
+        <p:cTn id="1" dur="indefinite" restart="never" nodeType="tmRoot">
+          <p:childTnLst>
+            <p:seq concurrent="1" nextAc="seek">
+              <p:cTn id="2" dur="indefinite" nodeType="mainSeq">
+                <p:childTnLst>
+                  <p:par>
+                    <p:cTn id="3" fill="hold">
+                      <p:stCondLst>
+                        <p:cond delay="indefinite"/>
+                      </p:stCondLst>
+                      <p:childTnLst>
+                        <p:par>
+                          <p:cTn id="4" fill="hold">
+                            <p:stCondLst>
+                              <p:cond delay="0"/>
+                            </p:stCondLst>
+                            <p:childTnLst>
+                              <p:par>
+                                <p:cTn id="5" presetID="1" presetClass="entr" presetSubtype="0" fill="hold" nodeType="clickEffect">
+                                  <p:stCondLst>
+                                    <p:cond delay="0"/>
+                                  </p:stCondLst>
+                                  <p:childTnLst>
+                                    <p:set>
+                                      <p:cBhvr>
+                                        <p:cTn id="6" dur="1" fill="hold">
+                                          <p:stCondLst>
+                                            <p:cond delay="0"/>
+                                          </p:stCondLst>
+                                        </p:cTn>
+                                        <p:tgtEl>
+                                          <p:spTgt spid="8">
+                                            <p:txEl>
+                                              <p:pRg st="0" end="0"/>
+                                            </p:txEl>
+                                          </p:spTgt>
+                                        </p:tgtEl>
+                                        <p:attrNameLst>
+                                          <p:attrName>style.visibility</p:attrName>
+                                        </p:attrNameLst>
+                                      </p:cBhvr>
+                                      <p:to>
+                                        <p:strVal val="visible"/>
+                                      </p:to>
+                                    </p:set>
+                                  </p:childTnLst>
+                                </p:cTn>
+                              </p:par>
+                              <p:par>
+                                <p:cTn id="7" presetID="1" presetClass="entr" presetSubtype="0" fill="hold" nodeType="withEffect">
+                                  <p:stCondLst>
+                                    <p:cond delay="0"/>
+                                  </p:stCondLst>
+                                  <p:childTnLst>
+                                    <p:set>
+                                      <p:cBhvr>
+                                        <p:cTn id="8" dur="1" fill="hold">
+                                          <p:stCondLst>
+                                            <p:cond delay="0"/>
+                                          </p:stCondLst>
+                                        </p:cTn>
+                                        <p:tgtEl>
+                                          <p:spTgt spid="8">
+                                            <p:txEl>
+                                              <p:pRg st="2" end="2"/>
+                                            </p:txEl>
+                                          </p:spTgt>
+                                        </p:tgtEl>
+                                        <p:attrNameLst>
+                                          <p:attrName>style.visibility</p:attrName>
+                                        </p:attrNameLst>
+                                      </p:cBhvr>
+                                      <p:to>
+                                        <p:strVal val="visible"/>
+                                      </p:to>
+                                    </p:set>
+                                  </p:childTnLst>
+                                </p:cTn>
+                              </p:par>
+                            </p:childTnLst>
+                          </p:cTn>
+                        </p:par>
+                      </p:childTnLst>
+                    </p:cTn>
+                  </p:par>
+                  <p:par>
+                    <p:cTn id="9" fill="hold">
+                      <p:stCondLst>
+                        <p:cond delay="indefinite"/>
+                      </p:stCondLst>
+                      <p:childTnLst>
+                        <p:par>
+                          <p:cTn id="10" fill="hold">
+                            <p:stCondLst>
+                              <p:cond delay="0"/>
+                            </p:stCondLst>
+                            <p:childTnLst>
+                              <p:par>
+                                <p:cTn id="11" presetID="1" presetClass="entr" presetSubtype="0" fill="hold" nodeType="clickEffect">
+                                  <p:stCondLst>
+                                    <p:cond delay="0"/>
+                                  </p:stCondLst>
+                                  <p:childTnLst>
+                                    <p:set>
+                                      <p:cBhvr>
+                                        <p:cTn id="12" dur="1" fill="hold">
+                                          <p:stCondLst>
+                                            <p:cond delay="0"/>
+                                          </p:stCondLst>
+                                        </p:cTn>
+                                        <p:tgtEl>
+                                          <p:spTgt spid="8">
+                                            <p:txEl>
+                                              <p:pRg st="4" end="4"/>
+                                            </p:txEl>
+                                          </p:spTgt>
+                                        </p:tgtEl>
+                                        <p:attrNameLst>
+                                          <p:attrName>style.visibility</p:attrName>
+                                        </p:attrNameLst>
+                                      </p:cBhvr>
+                                      <p:to>
+                                        <p:strVal val="visible"/>
+                                      </p:to>
+                                    </p:set>
+                                  </p:childTnLst>
+                                </p:cTn>
+                              </p:par>
+                              <p:par>
+                                <p:cTn id="13" presetID="1" presetClass="entr" presetSubtype="0" fill="hold" nodeType="withEffect">
+                                  <p:stCondLst>
+                                    <p:cond delay="0"/>
+                                  </p:stCondLst>
+                                  <p:childTnLst>
+                                    <p:set>
+                                      <p:cBhvr>
+                                        <p:cTn id="14" dur="1" fill="hold">
+                                          <p:stCondLst>
+                                            <p:cond delay="0"/>
+                                          </p:stCondLst>
+                                        </p:cTn>
+                                        <p:tgtEl>
+                                          <p:spTgt spid="8">
+                                            <p:txEl>
+                                              <p:pRg st="6" end="6"/>
+                                            </p:txEl>
+                                          </p:spTgt>
+                                        </p:tgtEl>
+                                        <p:attrNameLst>
+                                          <p:attrName>style.visibility</p:attrName>
+                                        </p:attrNameLst>
+                                      </p:cBhvr>
+                                      <p:to>
+                                        <p:strVal val="visible"/>
+                                      </p:to>
+                                    </p:set>
+                                  </p:childTnLst>
+                                </p:cTn>
+                              </p:par>
+                            </p:childTnLst>
+                          </p:cTn>
+                        </p:par>
+                      </p:childTnLst>
+                    </p:cTn>
+                  </p:par>
+                  <p:par>
+                    <p:cTn id="15" fill="hold">
+                      <p:stCondLst>
+                        <p:cond delay="indefinite"/>
+                      </p:stCondLst>
+                      <p:childTnLst>
+                        <p:par>
+                          <p:cTn id="16" fill="hold">
+                            <p:stCondLst>
+                              <p:cond delay="0"/>
+                            </p:stCondLst>
+                            <p:childTnLst>
+                              <p:par>
+                                <p:cTn id="17" presetID="1" presetClass="entr" presetSubtype="0" fill="hold" nodeType="clickEffect">
+                                  <p:stCondLst>
+                                    <p:cond delay="0"/>
+                                  </p:stCondLst>
+                                  <p:childTnLst>
+                                    <p:set>
+                                      <p:cBhvr>
+                                        <p:cTn id="18" dur="1" fill="hold">
+                                          <p:stCondLst>
+                                            <p:cond delay="0"/>
+                                          </p:stCondLst>
+                                        </p:cTn>
+                                        <p:tgtEl>
+                                          <p:spTgt spid="8">
+                                            <p:txEl>
+                                              <p:pRg st="8" end="8"/>
+                                            </p:txEl>
+                                          </p:spTgt>
+                                        </p:tgtEl>
+                                        <p:attrNameLst>
+                                          <p:attrName>style.visibility</p:attrName>
+                                        </p:attrNameLst>
+                                      </p:cBhvr>
+                                      <p:to>
+                                        <p:strVal val="visible"/>
+                                      </p:to>
+                                    </p:set>
+                                  </p:childTnLst>
+                                </p:cTn>
+                              </p:par>
+                              <p:par>
+                                <p:cTn id="19" presetID="1" presetClass="entr" presetSubtype="0" fill="hold" nodeType="withEffect">
+                                  <p:stCondLst>
+                                    <p:cond delay="0"/>
+                                  </p:stCondLst>
+                                  <p:childTnLst>
+                                    <p:set>
+                                      <p:cBhvr>
+                                        <p:cTn id="20" dur="1" fill="hold">
+                                          <p:stCondLst>
+                                            <p:cond delay="0"/>
+                                          </p:stCondLst>
+                                        </p:cTn>
+                                        <p:tgtEl>
+                                          <p:spTgt spid="8">
+                                            <p:txEl>
+                                              <p:pRg st="10" end="10"/>
+                                            </p:txEl>
+                                          </p:spTgt>
+                                        </p:tgtEl>
+                                        <p:attrNameLst>
+                                          <p:attrName>style.visibility</p:attrName>
+                                        </p:attrNameLst>
+                                      </p:cBhvr>
+                                      <p:to>
+                                        <p:strVal val="visible"/>
+                                      </p:to>
+                                    </p:set>
+                                  </p:childTnLst>
+                                </p:cTn>
+                              </p:par>
+                            </p:childTnLst>
+                          </p:cTn>
+                        </p:par>
+                      </p:childTnLst>
+                    </p:cTn>
+                  </p:par>
+                  <p:par>
+                    <p:cTn id="21" fill="hold">
+                      <p:stCondLst>
+                        <p:cond delay="indefinite"/>
+                      </p:stCondLst>
+                      <p:childTnLst>
+                        <p:par>
+                          <p:cTn id="22" fill="hold">
+                            <p:stCondLst>
+                              <p:cond delay="0"/>
+                            </p:stCondLst>
+                            <p:childTnLst>
+                              <p:par>
+                                <p:cTn id="23" presetID="1" presetClass="entr" presetSubtype="0" fill="hold" nodeType="clickEffect">
+                                  <p:stCondLst>
+                                    <p:cond delay="0"/>
+                                  </p:stCondLst>
+                                  <p:childTnLst>
+                                    <p:set>
+                                      <p:cBhvr>
+                                        <p:cTn id="24" dur="1" fill="hold">
+                                          <p:stCondLst>
+                                            <p:cond delay="0"/>
+                                          </p:stCondLst>
+                                        </p:cTn>
+                                        <p:tgtEl>
+                                          <p:spTgt spid="8">
+                                            <p:txEl>
+                                              <p:pRg st="12" end="12"/>
+                                            </p:txEl>
+                                          </p:spTgt>
+                                        </p:tgtEl>
+                                        <p:attrNameLst>
+                                          <p:attrName>style.visibility</p:attrName>
+                                        </p:attrNameLst>
+                                      </p:cBhvr>
+                                      <p:to>
+                                        <p:strVal val="visible"/>
+                                      </p:to>
+                                    </p:set>
+                                  </p:childTnLst>
+                                </p:cTn>
+                              </p:par>
+                            </p:childTnLst>
+                          </p:cTn>
+                        </p:par>
+                      </p:childTnLst>
+                    </p:cTn>
+                  </p:par>
+                </p:childTnLst>
+              </p:cTn>
+              <p:prevCondLst>
+                <p:cond evt="onPrev" delay="0">
+                  <p:tgtEl>
+                    <p:sldTgt/>
+                  </p:tgtEl>
+                </p:cond>
+              </p:prevCondLst>
+              <p:nextCondLst>
+                <p:cond evt="onNext" delay="0">
+                  <p:tgtEl>
+                    <p:sldTgt/>
+                  </p:tgtEl>
+                </p:cond>
+              </p:nextCondLst>
+            </p:seq>
+          </p:childTnLst>
+        </p:cTn>
+      </p:par>
+    </p:tnLst>
+  </p:timing>
 </p:sld>
 </file>
 
@@ -17463,6 +20372,439 @@
   <p:clrMapOvr>
     <a:masterClrMapping/>
   </p:clrMapOvr>
+  <p:timing>
+    <p:tnLst>
+      <p:par>
+        <p:cTn id="1" dur="indefinite" restart="never" nodeType="tmRoot">
+          <p:childTnLst>
+            <p:seq concurrent="1" nextAc="seek">
+              <p:cTn id="2" dur="indefinite" nodeType="mainSeq">
+                <p:childTnLst>
+                  <p:par>
+                    <p:cTn id="3" fill="hold">
+                      <p:stCondLst>
+                        <p:cond delay="indefinite"/>
+                      </p:stCondLst>
+                      <p:childTnLst>
+                        <p:par>
+                          <p:cTn id="4" fill="hold">
+                            <p:stCondLst>
+                              <p:cond delay="0"/>
+                            </p:stCondLst>
+                            <p:childTnLst>
+                              <p:par>
+                                <p:cTn id="5" presetID="1" presetClass="entr" presetSubtype="0" fill="hold" grpId="0" nodeType="clickEffect">
+                                  <p:stCondLst>
+                                    <p:cond delay="0"/>
+                                  </p:stCondLst>
+                                  <p:childTnLst>
+                                    <p:set>
+                                      <p:cBhvr>
+                                        <p:cTn id="6" dur="1" fill="hold">
+                                          <p:stCondLst>
+                                            <p:cond delay="0"/>
+                                          </p:stCondLst>
+                                        </p:cTn>
+                                        <p:tgtEl>
+                                          <p:spTgt spid="6">
+                                            <p:txEl>
+                                              <p:pRg st="0" end="0"/>
+                                            </p:txEl>
+                                          </p:spTgt>
+                                        </p:tgtEl>
+                                        <p:attrNameLst>
+                                          <p:attrName>style.visibility</p:attrName>
+                                        </p:attrNameLst>
+                                      </p:cBhvr>
+                                      <p:to>
+                                        <p:strVal val="visible"/>
+                                      </p:to>
+                                    </p:set>
+                                  </p:childTnLst>
+                                </p:cTn>
+                              </p:par>
+                              <p:par>
+                                <p:cTn id="7" presetID="1" presetClass="entr" presetSubtype="0" fill="hold" grpId="0" nodeType="withEffect">
+                                  <p:stCondLst>
+                                    <p:cond delay="0"/>
+                                  </p:stCondLst>
+                                  <p:childTnLst>
+                                    <p:set>
+                                      <p:cBhvr>
+                                        <p:cTn id="8" dur="1" fill="hold">
+                                          <p:stCondLst>
+                                            <p:cond delay="0"/>
+                                          </p:stCondLst>
+                                        </p:cTn>
+                                        <p:tgtEl>
+                                          <p:spTgt spid="6">
+                                            <p:txEl>
+                                              <p:pRg st="1" end="1"/>
+                                            </p:txEl>
+                                          </p:spTgt>
+                                        </p:tgtEl>
+                                        <p:attrNameLst>
+                                          <p:attrName>style.visibility</p:attrName>
+                                        </p:attrNameLst>
+                                      </p:cBhvr>
+                                      <p:to>
+                                        <p:strVal val="visible"/>
+                                      </p:to>
+                                    </p:set>
+                                  </p:childTnLst>
+                                </p:cTn>
+                              </p:par>
+                            </p:childTnLst>
+                          </p:cTn>
+                        </p:par>
+                      </p:childTnLst>
+                    </p:cTn>
+                  </p:par>
+                  <p:par>
+                    <p:cTn id="9" fill="hold">
+                      <p:stCondLst>
+                        <p:cond delay="indefinite"/>
+                      </p:stCondLst>
+                      <p:childTnLst>
+                        <p:par>
+                          <p:cTn id="10" fill="hold">
+                            <p:stCondLst>
+                              <p:cond delay="0"/>
+                            </p:stCondLst>
+                            <p:childTnLst>
+                              <p:par>
+                                <p:cTn id="11" presetID="1" presetClass="entr" presetSubtype="0" fill="hold" grpId="0" nodeType="clickEffect">
+                                  <p:stCondLst>
+                                    <p:cond delay="0"/>
+                                  </p:stCondLst>
+                                  <p:childTnLst>
+                                    <p:set>
+                                      <p:cBhvr>
+                                        <p:cTn id="12" dur="1" fill="hold">
+                                          <p:stCondLst>
+                                            <p:cond delay="0"/>
+                                          </p:stCondLst>
+                                        </p:cTn>
+                                        <p:tgtEl>
+                                          <p:spTgt spid="6">
+                                            <p:txEl>
+                                              <p:pRg st="3" end="3"/>
+                                            </p:txEl>
+                                          </p:spTgt>
+                                        </p:tgtEl>
+                                        <p:attrNameLst>
+                                          <p:attrName>style.visibility</p:attrName>
+                                        </p:attrNameLst>
+                                      </p:cBhvr>
+                                      <p:to>
+                                        <p:strVal val="visible"/>
+                                      </p:to>
+                                    </p:set>
+                                  </p:childTnLst>
+                                </p:cTn>
+                              </p:par>
+                              <p:par>
+                                <p:cTn id="13" presetID="1" presetClass="entr" presetSubtype="0" fill="hold" grpId="0" nodeType="withEffect">
+                                  <p:stCondLst>
+                                    <p:cond delay="0"/>
+                                  </p:stCondLst>
+                                  <p:childTnLst>
+                                    <p:set>
+                                      <p:cBhvr>
+                                        <p:cTn id="14" dur="1" fill="hold">
+                                          <p:stCondLst>
+                                            <p:cond delay="0"/>
+                                          </p:stCondLst>
+                                        </p:cTn>
+                                        <p:tgtEl>
+                                          <p:spTgt spid="6">
+                                            <p:txEl>
+                                              <p:pRg st="4" end="4"/>
+                                            </p:txEl>
+                                          </p:spTgt>
+                                        </p:tgtEl>
+                                        <p:attrNameLst>
+                                          <p:attrName>style.visibility</p:attrName>
+                                        </p:attrNameLst>
+                                      </p:cBhvr>
+                                      <p:to>
+                                        <p:strVal val="visible"/>
+                                      </p:to>
+                                    </p:set>
+                                  </p:childTnLst>
+                                </p:cTn>
+                              </p:par>
+                            </p:childTnLst>
+                          </p:cTn>
+                        </p:par>
+                      </p:childTnLst>
+                    </p:cTn>
+                  </p:par>
+                  <p:par>
+                    <p:cTn id="15" fill="hold">
+                      <p:stCondLst>
+                        <p:cond delay="indefinite"/>
+                      </p:stCondLst>
+                      <p:childTnLst>
+                        <p:par>
+                          <p:cTn id="16" fill="hold">
+                            <p:stCondLst>
+                              <p:cond delay="0"/>
+                            </p:stCondLst>
+                            <p:childTnLst>
+                              <p:par>
+                                <p:cTn id="17" presetID="1" presetClass="entr" presetSubtype="0" fill="hold" grpId="0" nodeType="clickEffect">
+                                  <p:stCondLst>
+                                    <p:cond delay="0"/>
+                                  </p:stCondLst>
+                                  <p:childTnLst>
+                                    <p:set>
+                                      <p:cBhvr>
+                                        <p:cTn id="18" dur="1" fill="hold">
+                                          <p:stCondLst>
+                                            <p:cond delay="0"/>
+                                          </p:stCondLst>
+                                        </p:cTn>
+                                        <p:tgtEl>
+                                          <p:spTgt spid="6">
+                                            <p:txEl>
+                                              <p:pRg st="6" end="6"/>
+                                            </p:txEl>
+                                          </p:spTgt>
+                                        </p:tgtEl>
+                                        <p:attrNameLst>
+                                          <p:attrName>style.visibility</p:attrName>
+                                        </p:attrNameLst>
+                                      </p:cBhvr>
+                                      <p:to>
+                                        <p:strVal val="visible"/>
+                                      </p:to>
+                                    </p:set>
+                                  </p:childTnLst>
+                                </p:cTn>
+                              </p:par>
+                              <p:par>
+                                <p:cTn id="19" presetID="1" presetClass="entr" presetSubtype="0" fill="hold" grpId="0" nodeType="withEffect">
+                                  <p:stCondLst>
+                                    <p:cond delay="0"/>
+                                  </p:stCondLst>
+                                  <p:childTnLst>
+                                    <p:set>
+                                      <p:cBhvr>
+                                        <p:cTn id="20" dur="1" fill="hold">
+                                          <p:stCondLst>
+                                            <p:cond delay="0"/>
+                                          </p:stCondLst>
+                                        </p:cTn>
+                                        <p:tgtEl>
+                                          <p:spTgt spid="6">
+                                            <p:txEl>
+                                              <p:pRg st="7" end="7"/>
+                                            </p:txEl>
+                                          </p:spTgt>
+                                        </p:tgtEl>
+                                        <p:attrNameLst>
+                                          <p:attrName>style.visibility</p:attrName>
+                                        </p:attrNameLst>
+                                      </p:cBhvr>
+                                      <p:to>
+                                        <p:strVal val="visible"/>
+                                      </p:to>
+                                    </p:set>
+                                  </p:childTnLst>
+                                </p:cTn>
+                              </p:par>
+                            </p:childTnLst>
+                          </p:cTn>
+                        </p:par>
+                      </p:childTnLst>
+                    </p:cTn>
+                  </p:par>
+                  <p:par>
+                    <p:cTn id="21" fill="hold">
+                      <p:stCondLst>
+                        <p:cond delay="indefinite"/>
+                      </p:stCondLst>
+                      <p:childTnLst>
+                        <p:par>
+                          <p:cTn id="22" fill="hold">
+                            <p:stCondLst>
+                              <p:cond delay="0"/>
+                            </p:stCondLst>
+                            <p:childTnLst>
+                              <p:par>
+                                <p:cTn id="23" presetID="1" presetClass="entr" presetSubtype="0" fill="hold" grpId="0" nodeType="clickEffect">
+                                  <p:stCondLst>
+                                    <p:cond delay="0"/>
+                                  </p:stCondLst>
+                                  <p:childTnLst>
+                                    <p:set>
+                                      <p:cBhvr>
+                                        <p:cTn id="24" dur="1" fill="hold">
+                                          <p:stCondLst>
+                                            <p:cond delay="0"/>
+                                          </p:stCondLst>
+                                        </p:cTn>
+                                        <p:tgtEl>
+                                          <p:spTgt spid="6">
+                                            <p:txEl>
+                                              <p:pRg st="9" end="9"/>
+                                            </p:txEl>
+                                          </p:spTgt>
+                                        </p:tgtEl>
+                                        <p:attrNameLst>
+                                          <p:attrName>style.visibility</p:attrName>
+                                        </p:attrNameLst>
+                                      </p:cBhvr>
+                                      <p:to>
+                                        <p:strVal val="visible"/>
+                                      </p:to>
+                                    </p:set>
+                                  </p:childTnLst>
+                                </p:cTn>
+                              </p:par>
+                              <p:par>
+                                <p:cTn id="25" presetID="1" presetClass="entr" presetSubtype="0" fill="hold" grpId="0" nodeType="withEffect">
+                                  <p:stCondLst>
+                                    <p:cond delay="0"/>
+                                  </p:stCondLst>
+                                  <p:childTnLst>
+                                    <p:set>
+                                      <p:cBhvr>
+                                        <p:cTn id="26" dur="1" fill="hold">
+                                          <p:stCondLst>
+                                            <p:cond delay="0"/>
+                                          </p:stCondLst>
+                                        </p:cTn>
+                                        <p:tgtEl>
+                                          <p:spTgt spid="6">
+                                            <p:txEl>
+                                              <p:pRg st="10" end="10"/>
+                                            </p:txEl>
+                                          </p:spTgt>
+                                        </p:tgtEl>
+                                        <p:attrNameLst>
+                                          <p:attrName>style.visibility</p:attrName>
+                                        </p:attrNameLst>
+                                      </p:cBhvr>
+                                      <p:to>
+                                        <p:strVal val="visible"/>
+                                      </p:to>
+                                    </p:set>
+                                  </p:childTnLst>
+                                </p:cTn>
+                              </p:par>
+                            </p:childTnLst>
+                          </p:cTn>
+                        </p:par>
+                      </p:childTnLst>
+                    </p:cTn>
+                  </p:par>
+                  <p:par>
+                    <p:cTn id="27" fill="hold">
+                      <p:stCondLst>
+                        <p:cond delay="indefinite"/>
+                      </p:stCondLst>
+                      <p:childTnLst>
+                        <p:par>
+                          <p:cTn id="28" fill="hold">
+                            <p:stCondLst>
+                              <p:cond delay="0"/>
+                            </p:stCondLst>
+                            <p:childTnLst>
+                              <p:par>
+                                <p:cTn id="29" presetID="1" presetClass="entr" presetSubtype="0" fill="hold" grpId="0" nodeType="clickEffect">
+                                  <p:stCondLst>
+                                    <p:cond delay="0"/>
+                                  </p:stCondLst>
+                                  <p:childTnLst>
+                                    <p:set>
+                                      <p:cBhvr>
+                                        <p:cTn id="30" dur="1" fill="hold">
+                                          <p:stCondLst>
+                                            <p:cond delay="0"/>
+                                          </p:stCondLst>
+                                        </p:cTn>
+                                        <p:tgtEl>
+                                          <p:spTgt spid="6">
+                                            <p:txEl>
+                                              <p:pRg st="12" end="12"/>
+                                            </p:txEl>
+                                          </p:spTgt>
+                                        </p:tgtEl>
+                                        <p:attrNameLst>
+                                          <p:attrName>style.visibility</p:attrName>
+                                        </p:attrNameLst>
+                                      </p:cBhvr>
+                                      <p:to>
+                                        <p:strVal val="visible"/>
+                                      </p:to>
+                                    </p:set>
+                                  </p:childTnLst>
+                                </p:cTn>
+                              </p:par>
+                              <p:par>
+                                <p:cTn id="31" presetID="1" presetClass="entr" presetSubtype="0" fill="hold" grpId="0" nodeType="withEffect">
+                                  <p:stCondLst>
+                                    <p:cond delay="0"/>
+                                  </p:stCondLst>
+                                  <p:childTnLst>
+                                    <p:set>
+                                      <p:cBhvr>
+                                        <p:cTn id="32" dur="1" fill="hold">
+                                          <p:stCondLst>
+                                            <p:cond delay="0"/>
+                                          </p:stCondLst>
+                                        </p:cTn>
+                                        <p:tgtEl>
+                                          <p:spTgt spid="6">
+                                            <p:txEl>
+                                              <p:pRg st="13" end="13"/>
+                                            </p:txEl>
+                                          </p:spTgt>
+                                        </p:tgtEl>
+                                        <p:attrNameLst>
+                                          <p:attrName>style.visibility</p:attrName>
+                                        </p:attrNameLst>
+                                      </p:cBhvr>
+                                      <p:to>
+                                        <p:strVal val="visible"/>
+                                      </p:to>
+                                    </p:set>
+                                  </p:childTnLst>
+                                </p:cTn>
+                              </p:par>
+                            </p:childTnLst>
+                          </p:cTn>
+                        </p:par>
+                      </p:childTnLst>
+                    </p:cTn>
+                  </p:par>
+                </p:childTnLst>
+              </p:cTn>
+              <p:prevCondLst>
+                <p:cond evt="onPrev" delay="0">
+                  <p:tgtEl>
+                    <p:sldTgt/>
+                  </p:tgtEl>
+                </p:cond>
+              </p:prevCondLst>
+              <p:nextCondLst>
+                <p:cond evt="onNext" delay="0">
+                  <p:tgtEl>
+                    <p:sldTgt/>
+                  </p:tgtEl>
+                </p:cond>
+              </p:nextCondLst>
+            </p:seq>
+          </p:childTnLst>
+        </p:cTn>
+      </p:par>
+    </p:tnLst>
+    <p:bldLst>
+      <p:bldP spid="6" grpId="0" build="p"/>
+    </p:bldLst>
+  </p:timing>
 </p:sld>
 </file>
 
@@ -17840,6 +21182,439 @@
   <p:clrMapOvr>
     <a:masterClrMapping/>
   </p:clrMapOvr>
+  <p:timing>
+    <p:tnLst>
+      <p:par>
+        <p:cTn id="1" dur="indefinite" restart="never" nodeType="tmRoot">
+          <p:childTnLst>
+            <p:seq concurrent="1" nextAc="seek">
+              <p:cTn id="2" dur="indefinite" nodeType="mainSeq">
+                <p:childTnLst>
+                  <p:par>
+                    <p:cTn id="3" fill="hold">
+                      <p:stCondLst>
+                        <p:cond delay="indefinite"/>
+                      </p:stCondLst>
+                      <p:childTnLst>
+                        <p:par>
+                          <p:cTn id="4" fill="hold">
+                            <p:stCondLst>
+                              <p:cond delay="0"/>
+                            </p:stCondLst>
+                            <p:childTnLst>
+                              <p:par>
+                                <p:cTn id="5" presetID="1" presetClass="entr" presetSubtype="0" fill="hold" grpId="0" nodeType="clickEffect">
+                                  <p:stCondLst>
+                                    <p:cond delay="0"/>
+                                  </p:stCondLst>
+                                  <p:childTnLst>
+                                    <p:set>
+                                      <p:cBhvr>
+                                        <p:cTn id="6" dur="1" fill="hold">
+                                          <p:stCondLst>
+                                            <p:cond delay="0"/>
+                                          </p:stCondLst>
+                                        </p:cTn>
+                                        <p:tgtEl>
+                                          <p:spTgt spid="10">
+                                            <p:txEl>
+                                              <p:pRg st="0" end="0"/>
+                                            </p:txEl>
+                                          </p:spTgt>
+                                        </p:tgtEl>
+                                        <p:attrNameLst>
+                                          <p:attrName>style.visibility</p:attrName>
+                                        </p:attrNameLst>
+                                      </p:cBhvr>
+                                      <p:to>
+                                        <p:strVal val="visible"/>
+                                      </p:to>
+                                    </p:set>
+                                  </p:childTnLst>
+                                </p:cTn>
+                              </p:par>
+                              <p:par>
+                                <p:cTn id="7" presetID="1" presetClass="entr" presetSubtype="0" fill="hold" grpId="0" nodeType="withEffect">
+                                  <p:stCondLst>
+                                    <p:cond delay="0"/>
+                                  </p:stCondLst>
+                                  <p:childTnLst>
+                                    <p:set>
+                                      <p:cBhvr>
+                                        <p:cTn id="8" dur="1" fill="hold">
+                                          <p:stCondLst>
+                                            <p:cond delay="0"/>
+                                          </p:stCondLst>
+                                        </p:cTn>
+                                        <p:tgtEl>
+                                          <p:spTgt spid="10">
+                                            <p:txEl>
+                                              <p:pRg st="1" end="1"/>
+                                            </p:txEl>
+                                          </p:spTgt>
+                                        </p:tgtEl>
+                                        <p:attrNameLst>
+                                          <p:attrName>style.visibility</p:attrName>
+                                        </p:attrNameLst>
+                                      </p:cBhvr>
+                                      <p:to>
+                                        <p:strVal val="visible"/>
+                                      </p:to>
+                                    </p:set>
+                                  </p:childTnLst>
+                                </p:cTn>
+                              </p:par>
+                            </p:childTnLst>
+                          </p:cTn>
+                        </p:par>
+                      </p:childTnLst>
+                    </p:cTn>
+                  </p:par>
+                  <p:par>
+                    <p:cTn id="9" fill="hold">
+                      <p:stCondLst>
+                        <p:cond delay="indefinite"/>
+                      </p:stCondLst>
+                      <p:childTnLst>
+                        <p:par>
+                          <p:cTn id="10" fill="hold">
+                            <p:stCondLst>
+                              <p:cond delay="0"/>
+                            </p:stCondLst>
+                            <p:childTnLst>
+                              <p:par>
+                                <p:cTn id="11" presetID="1" presetClass="entr" presetSubtype="0" fill="hold" grpId="0" nodeType="clickEffect">
+                                  <p:stCondLst>
+                                    <p:cond delay="0"/>
+                                  </p:stCondLst>
+                                  <p:childTnLst>
+                                    <p:set>
+                                      <p:cBhvr>
+                                        <p:cTn id="12" dur="1" fill="hold">
+                                          <p:stCondLst>
+                                            <p:cond delay="0"/>
+                                          </p:stCondLst>
+                                        </p:cTn>
+                                        <p:tgtEl>
+                                          <p:spTgt spid="10">
+                                            <p:txEl>
+                                              <p:pRg st="3" end="3"/>
+                                            </p:txEl>
+                                          </p:spTgt>
+                                        </p:tgtEl>
+                                        <p:attrNameLst>
+                                          <p:attrName>style.visibility</p:attrName>
+                                        </p:attrNameLst>
+                                      </p:cBhvr>
+                                      <p:to>
+                                        <p:strVal val="visible"/>
+                                      </p:to>
+                                    </p:set>
+                                  </p:childTnLst>
+                                </p:cTn>
+                              </p:par>
+                              <p:par>
+                                <p:cTn id="13" presetID="1" presetClass="entr" presetSubtype="0" fill="hold" grpId="0" nodeType="withEffect">
+                                  <p:stCondLst>
+                                    <p:cond delay="0"/>
+                                  </p:stCondLst>
+                                  <p:childTnLst>
+                                    <p:set>
+                                      <p:cBhvr>
+                                        <p:cTn id="14" dur="1" fill="hold">
+                                          <p:stCondLst>
+                                            <p:cond delay="0"/>
+                                          </p:stCondLst>
+                                        </p:cTn>
+                                        <p:tgtEl>
+                                          <p:spTgt spid="10">
+                                            <p:txEl>
+                                              <p:pRg st="4" end="4"/>
+                                            </p:txEl>
+                                          </p:spTgt>
+                                        </p:tgtEl>
+                                        <p:attrNameLst>
+                                          <p:attrName>style.visibility</p:attrName>
+                                        </p:attrNameLst>
+                                      </p:cBhvr>
+                                      <p:to>
+                                        <p:strVal val="visible"/>
+                                      </p:to>
+                                    </p:set>
+                                  </p:childTnLst>
+                                </p:cTn>
+                              </p:par>
+                            </p:childTnLst>
+                          </p:cTn>
+                        </p:par>
+                      </p:childTnLst>
+                    </p:cTn>
+                  </p:par>
+                  <p:par>
+                    <p:cTn id="15" fill="hold">
+                      <p:stCondLst>
+                        <p:cond delay="indefinite"/>
+                      </p:stCondLst>
+                      <p:childTnLst>
+                        <p:par>
+                          <p:cTn id="16" fill="hold">
+                            <p:stCondLst>
+                              <p:cond delay="0"/>
+                            </p:stCondLst>
+                            <p:childTnLst>
+                              <p:par>
+                                <p:cTn id="17" presetID="1" presetClass="entr" presetSubtype="0" fill="hold" grpId="0" nodeType="clickEffect">
+                                  <p:stCondLst>
+                                    <p:cond delay="0"/>
+                                  </p:stCondLst>
+                                  <p:childTnLst>
+                                    <p:set>
+                                      <p:cBhvr>
+                                        <p:cTn id="18" dur="1" fill="hold">
+                                          <p:stCondLst>
+                                            <p:cond delay="0"/>
+                                          </p:stCondLst>
+                                        </p:cTn>
+                                        <p:tgtEl>
+                                          <p:spTgt spid="10">
+                                            <p:txEl>
+                                              <p:pRg st="6" end="6"/>
+                                            </p:txEl>
+                                          </p:spTgt>
+                                        </p:tgtEl>
+                                        <p:attrNameLst>
+                                          <p:attrName>style.visibility</p:attrName>
+                                        </p:attrNameLst>
+                                      </p:cBhvr>
+                                      <p:to>
+                                        <p:strVal val="visible"/>
+                                      </p:to>
+                                    </p:set>
+                                  </p:childTnLst>
+                                </p:cTn>
+                              </p:par>
+                              <p:par>
+                                <p:cTn id="19" presetID="1" presetClass="entr" presetSubtype="0" fill="hold" grpId="0" nodeType="withEffect">
+                                  <p:stCondLst>
+                                    <p:cond delay="0"/>
+                                  </p:stCondLst>
+                                  <p:childTnLst>
+                                    <p:set>
+                                      <p:cBhvr>
+                                        <p:cTn id="20" dur="1" fill="hold">
+                                          <p:stCondLst>
+                                            <p:cond delay="0"/>
+                                          </p:stCondLst>
+                                        </p:cTn>
+                                        <p:tgtEl>
+                                          <p:spTgt spid="10">
+                                            <p:txEl>
+                                              <p:pRg st="7" end="7"/>
+                                            </p:txEl>
+                                          </p:spTgt>
+                                        </p:tgtEl>
+                                        <p:attrNameLst>
+                                          <p:attrName>style.visibility</p:attrName>
+                                        </p:attrNameLst>
+                                      </p:cBhvr>
+                                      <p:to>
+                                        <p:strVal val="visible"/>
+                                      </p:to>
+                                    </p:set>
+                                  </p:childTnLst>
+                                </p:cTn>
+                              </p:par>
+                            </p:childTnLst>
+                          </p:cTn>
+                        </p:par>
+                      </p:childTnLst>
+                    </p:cTn>
+                  </p:par>
+                  <p:par>
+                    <p:cTn id="21" fill="hold">
+                      <p:stCondLst>
+                        <p:cond delay="indefinite"/>
+                      </p:stCondLst>
+                      <p:childTnLst>
+                        <p:par>
+                          <p:cTn id="22" fill="hold">
+                            <p:stCondLst>
+                              <p:cond delay="0"/>
+                            </p:stCondLst>
+                            <p:childTnLst>
+                              <p:par>
+                                <p:cTn id="23" presetID="1" presetClass="entr" presetSubtype="0" fill="hold" grpId="0" nodeType="clickEffect">
+                                  <p:stCondLst>
+                                    <p:cond delay="0"/>
+                                  </p:stCondLst>
+                                  <p:childTnLst>
+                                    <p:set>
+                                      <p:cBhvr>
+                                        <p:cTn id="24" dur="1" fill="hold">
+                                          <p:stCondLst>
+                                            <p:cond delay="0"/>
+                                          </p:stCondLst>
+                                        </p:cTn>
+                                        <p:tgtEl>
+                                          <p:spTgt spid="10">
+                                            <p:txEl>
+                                              <p:pRg st="9" end="9"/>
+                                            </p:txEl>
+                                          </p:spTgt>
+                                        </p:tgtEl>
+                                        <p:attrNameLst>
+                                          <p:attrName>style.visibility</p:attrName>
+                                        </p:attrNameLst>
+                                      </p:cBhvr>
+                                      <p:to>
+                                        <p:strVal val="visible"/>
+                                      </p:to>
+                                    </p:set>
+                                  </p:childTnLst>
+                                </p:cTn>
+                              </p:par>
+                              <p:par>
+                                <p:cTn id="25" presetID="1" presetClass="entr" presetSubtype="0" fill="hold" grpId="0" nodeType="withEffect">
+                                  <p:stCondLst>
+                                    <p:cond delay="0"/>
+                                  </p:stCondLst>
+                                  <p:childTnLst>
+                                    <p:set>
+                                      <p:cBhvr>
+                                        <p:cTn id="26" dur="1" fill="hold">
+                                          <p:stCondLst>
+                                            <p:cond delay="0"/>
+                                          </p:stCondLst>
+                                        </p:cTn>
+                                        <p:tgtEl>
+                                          <p:spTgt spid="10">
+                                            <p:txEl>
+                                              <p:pRg st="10" end="10"/>
+                                            </p:txEl>
+                                          </p:spTgt>
+                                        </p:tgtEl>
+                                        <p:attrNameLst>
+                                          <p:attrName>style.visibility</p:attrName>
+                                        </p:attrNameLst>
+                                      </p:cBhvr>
+                                      <p:to>
+                                        <p:strVal val="visible"/>
+                                      </p:to>
+                                    </p:set>
+                                  </p:childTnLst>
+                                </p:cTn>
+                              </p:par>
+                            </p:childTnLst>
+                          </p:cTn>
+                        </p:par>
+                      </p:childTnLst>
+                    </p:cTn>
+                  </p:par>
+                  <p:par>
+                    <p:cTn id="27" fill="hold">
+                      <p:stCondLst>
+                        <p:cond delay="indefinite"/>
+                      </p:stCondLst>
+                      <p:childTnLst>
+                        <p:par>
+                          <p:cTn id="28" fill="hold">
+                            <p:stCondLst>
+                              <p:cond delay="0"/>
+                            </p:stCondLst>
+                            <p:childTnLst>
+                              <p:par>
+                                <p:cTn id="29" presetID="1" presetClass="entr" presetSubtype="0" fill="hold" grpId="0" nodeType="clickEffect">
+                                  <p:stCondLst>
+                                    <p:cond delay="0"/>
+                                  </p:stCondLst>
+                                  <p:childTnLst>
+                                    <p:set>
+                                      <p:cBhvr>
+                                        <p:cTn id="30" dur="1" fill="hold">
+                                          <p:stCondLst>
+                                            <p:cond delay="0"/>
+                                          </p:stCondLst>
+                                        </p:cTn>
+                                        <p:tgtEl>
+                                          <p:spTgt spid="10">
+                                            <p:txEl>
+                                              <p:pRg st="12" end="12"/>
+                                            </p:txEl>
+                                          </p:spTgt>
+                                        </p:tgtEl>
+                                        <p:attrNameLst>
+                                          <p:attrName>style.visibility</p:attrName>
+                                        </p:attrNameLst>
+                                      </p:cBhvr>
+                                      <p:to>
+                                        <p:strVal val="visible"/>
+                                      </p:to>
+                                    </p:set>
+                                  </p:childTnLst>
+                                </p:cTn>
+                              </p:par>
+                              <p:par>
+                                <p:cTn id="31" presetID="1" presetClass="entr" presetSubtype="0" fill="hold" grpId="0" nodeType="withEffect">
+                                  <p:stCondLst>
+                                    <p:cond delay="0"/>
+                                  </p:stCondLst>
+                                  <p:childTnLst>
+                                    <p:set>
+                                      <p:cBhvr>
+                                        <p:cTn id="32" dur="1" fill="hold">
+                                          <p:stCondLst>
+                                            <p:cond delay="0"/>
+                                          </p:stCondLst>
+                                        </p:cTn>
+                                        <p:tgtEl>
+                                          <p:spTgt spid="10">
+                                            <p:txEl>
+                                              <p:pRg st="13" end="13"/>
+                                            </p:txEl>
+                                          </p:spTgt>
+                                        </p:tgtEl>
+                                        <p:attrNameLst>
+                                          <p:attrName>style.visibility</p:attrName>
+                                        </p:attrNameLst>
+                                      </p:cBhvr>
+                                      <p:to>
+                                        <p:strVal val="visible"/>
+                                      </p:to>
+                                    </p:set>
+                                  </p:childTnLst>
+                                </p:cTn>
+                              </p:par>
+                            </p:childTnLst>
+                          </p:cTn>
+                        </p:par>
+                      </p:childTnLst>
+                    </p:cTn>
+                  </p:par>
+                </p:childTnLst>
+              </p:cTn>
+              <p:prevCondLst>
+                <p:cond evt="onPrev" delay="0">
+                  <p:tgtEl>
+                    <p:sldTgt/>
+                  </p:tgtEl>
+                </p:cond>
+              </p:prevCondLst>
+              <p:nextCondLst>
+                <p:cond evt="onNext" delay="0">
+                  <p:tgtEl>
+                    <p:sldTgt/>
+                  </p:tgtEl>
+                </p:cond>
+              </p:nextCondLst>
+            </p:seq>
+          </p:childTnLst>
+        </p:cTn>
+      </p:par>
+    </p:tnLst>
+    <p:bldLst>
+      <p:bldP spid="10" grpId="0" build="p"/>
+    </p:bldLst>
+  </p:timing>
 </p:sld>
 </file>
 

</xml_diff>